<commit_message>
push files about report1 in "システム工学基礎"
</commit_message>
<xml_diff>
--- a/システム工学基礎/システム工学基礎-課題1.pptx
+++ b/システム工学基礎/システム工学基礎-課題1.pptx
@@ -4,6 +4,9 @@
   <p:sldMasterIdLst>
     <p:sldMasterId id="2147483648" r:id="rId1"/>
   </p:sldMasterIdLst>
+  <p:notesMasterIdLst>
+    <p:notesMasterId r:id="rId10"/>
+  </p:notesMasterIdLst>
   <p:sldIdLst>
     <p:sldId id="256" r:id="rId2"/>
     <p:sldId id="257" r:id="rId3"/>
@@ -12,6 +15,7 @@
     <p:sldId id="259" r:id="rId6"/>
     <p:sldId id="262" r:id="rId7"/>
     <p:sldId id="260" r:id="rId8"/>
+    <p:sldId id="263" r:id="rId9"/>
   </p:sldIdLst>
   <p:sldSz cx="12192000" cy="6858000"/>
   <p:notesSz cx="6858000" cy="9144000"/>
@@ -110,7 +114,477 @@
       </a:defRPr>
     </a:lvl9pPr>
   </p:defaultTextStyle>
+  <p:extLst>
+    <p:ext uri="{EFAFB233-063F-42B5-8137-9DF3F51BA10A}">
+      <p15:sldGuideLst xmlns:p15="http://schemas.microsoft.com/office/powerpoint/2012/main"/>
+    </p:ext>
+  </p:extLst>
 </p:presentation>
+</file>
+
+<file path=ppt/notesMasters/notesMaster1.xml><?xml version="1.0" encoding="utf-8"?>
+<p:notesMaster xmlns:a="http://schemas.openxmlformats.org/drawingml/2006/main" xmlns:r="http://schemas.openxmlformats.org/officeDocument/2006/relationships" xmlns:p="http://schemas.openxmlformats.org/presentationml/2006/main">
+  <p:cSld>
+    <p:bg>
+      <p:bgRef idx="1001">
+        <a:schemeClr val="bg1"/>
+      </p:bgRef>
+    </p:bg>
+    <p:spTree>
+      <p:nvGrpSpPr>
+        <p:cNvPr id="1" name=""/>
+        <p:cNvGrpSpPr/>
+        <p:nvPr/>
+      </p:nvGrpSpPr>
+      <p:grpSpPr>
+        <a:xfrm>
+          <a:off x="0" y="0"/>
+          <a:ext cx="0" cy="0"/>
+          <a:chOff x="0" y="0"/>
+          <a:chExt cx="0" cy="0"/>
+        </a:xfrm>
+      </p:grpSpPr>
+      <p:sp>
+        <p:nvSpPr>
+          <p:cNvPr id="2" name="ヘッダー プレースホルダー 1"/>
+          <p:cNvSpPr>
+            <a:spLocks noGrp="1"/>
+          </p:cNvSpPr>
+          <p:nvPr>
+            <p:ph type="hdr" sz="quarter"/>
+          </p:nvPr>
+        </p:nvSpPr>
+        <p:spPr>
+          <a:xfrm>
+            <a:off x="0" y="0"/>
+            <a:ext cx="2971800" cy="458788"/>
+          </a:xfrm>
+          <a:prstGeom prst="rect">
+            <a:avLst/>
+          </a:prstGeom>
+        </p:spPr>
+        <p:txBody>
+          <a:bodyPr vert="horz" lIns="91440" tIns="45720" rIns="91440" bIns="45720" rtlCol="0"/>
+          <a:lstStyle>
+            <a:lvl1pPr algn="l">
+              <a:defRPr sz="1200"/>
+            </a:lvl1pPr>
+          </a:lstStyle>
+          <a:p>
+            <a:endParaRPr lang="ja-JP" altLang="en-US"/>
+          </a:p>
+        </p:txBody>
+      </p:sp>
+      <p:sp>
+        <p:nvSpPr>
+          <p:cNvPr id="3" name="日付プレースホルダー 2"/>
+          <p:cNvSpPr>
+            <a:spLocks noGrp="1"/>
+          </p:cNvSpPr>
+          <p:nvPr>
+            <p:ph type="dt" idx="1"/>
+          </p:nvPr>
+        </p:nvSpPr>
+        <p:spPr>
+          <a:xfrm>
+            <a:off x="3884613" y="0"/>
+            <a:ext cx="2971800" cy="458788"/>
+          </a:xfrm>
+          <a:prstGeom prst="rect">
+            <a:avLst/>
+          </a:prstGeom>
+        </p:spPr>
+        <p:txBody>
+          <a:bodyPr vert="horz" lIns="91440" tIns="45720" rIns="91440" bIns="45720" rtlCol="0"/>
+          <a:lstStyle>
+            <a:lvl1pPr algn="r">
+              <a:defRPr sz="1200"/>
+            </a:lvl1pPr>
+          </a:lstStyle>
+          <a:p>
+            <a:fld id="{81758D67-4F3F-4A17-81DB-D9AED5DC31EE}" type="datetimeFigureOut">
+              <a:rPr lang="en-US" altLang="ja-JP"/>
+              <a:t>2016/5/16</a:t>
+            </a:fld>
+            <a:endParaRPr lang="ja-JP" altLang="en-US"/>
+          </a:p>
+        </p:txBody>
+      </p:sp>
+      <p:sp>
+        <p:nvSpPr>
+          <p:cNvPr id="4" name="スライド イメージ プレースホルダー 3"/>
+          <p:cNvSpPr>
+            <a:spLocks noGrp="1" noRot="1" noChangeAspect="1"/>
+          </p:cNvSpPr>
+          <p:nvPr>
+            <p:ph type="sldImg" idx="2"/>
+          </p:nvPr>
+        </p:nvSpPr>
+        <p:spPr>
+          <a:xfrm>
+            <a:off x="685800" y="1143000"/>
+            <a:ext cx="5486400" cy="3086100"/>
+          </a:xfrm>
+          <a:prstGeom prst="rect">
+            <a:avLst/>
+          </a:prstGeom>
+          <a:noFill/>
+          <a:ln w="12700">
+            <a:solidFill>
+              <a:prstClr val="black"/>
+            </a:solidFill>
+          </a:ln>
+        </p:spPr>
+        <p:txBody>
+          <a:bodyPr vert="horz" lIns="91440" tIns="45720" rIns="91440" bIns="45720" rtlCol="0" anchor="ctr"/>
+          <a:lstStyle/>
+          <a:p>
+            <a:endParaRPr lang="ja-JP" altLang="en-US"/>
+          </a:p>
+        </p:txBody>
+      </p:sp>
+      <p:sp>
+        <p:nvSpPr>
+          <p:cNvPr id="5" name="ノート プレースホルダー 4"/>
+          <p:cNvSpPr>
+            <a:spLocks noGrp="1"/>
+          </p:cNvSpPr>
+          <p:nvPr>
+            <p:ph type="body" sz="quarter" idx="3"/>
+          </p:nvPr>
+        </p:nvSpPr>
+        <p:spPr>
+          <a:xfrm>
+            <a:off x="685800" y="4400550"/>
+            <a:ext cx="5486400" cy="3600450"/>
+          </a:xfrm>
+          <a:prstGeom prst="rect">
+            <a:avLst/>
+          </a:prstGeom>
+        </p:spPr>
+        <p:txBody>
+          <a:bodyPr vert="horz" lIns="91440" tIns="45720" rIns="91440" bIns="45720" rtlCol="0"/>
+          <a:lstStyle/>
+          <a:p>
+            <a:pPr lvl="0"/>
+            <a:r>
+              <a:rPr lang="ja-JP" altLang="en-US"/>
+              <a:t>マスター テキストの書式設定</a:t>
+            </a:r>
+          </a:p>
+          <a:p>
+            <a:pPr lvl="1"/>
+            <a:r>
+              <a:rPr lang="ja-JP" altLang="en-US"/>
+              <a:t>第 </a:t>
+            </a:r>
+            <a:r>
+              <a:rPr lang="en-US" altLang="ja-JP"/>
+              <a:t>2 </a:t>
+            </a:r>
+            <a:r>
+              <a:rPr lang="ja-JP" altLang="en-US"/>
+              <a:t>レベル</a:t>
+            </a:r>
+          </a:p>
+          <a:p>
+            <a:pPr lvl="2"/>
+            <a:r>
+              <a:rPr lang="ja-JP" altLang="en-US"/>
+              <a:t>第 </a:t>
+            </a:r>
+            <a:r>
+              <a:rPr lang="en-US" altLang="ja-JP"/>
+              <a:t>3 </a:t>
+            </a:r>
+            <a:r>
+              <a:rPr lang="ja-JP" altLang="en-US"/>
+              <a:t>レベル</a:t>
+            </a:r>
+          </a:p>
+          <a:p>
+            <a:pPr lvl="3"/>
+            <a:r>
+              <a:rPr lang="ja-JP" altLang="en-US"/>
+              <a:t>第 </a:t>
+            </a:r>
+            <a:r>
+              <a:rPr lang="en-US" altLang="ja-JP"/>
+              <a:t>4 </a:t>
+            </a:r>
+            <a:r>
+              <a:rPr lang="ja-JP" altLang="en-US"/>
+              <a:t>レベル</a:t>
+            </a:r>
+          </a:p>
+          <a:p>
+            <a:pPr lvl="4"/>
+            <a:r>
+              <a:rPr lang="ja-JP" altLang="en-US"/>
+              <a:t>第 </a:t>
+            </a:r>
+            <a:r>
+              <a:rPr lang="en-US" altLang="ja-JP"/>
+              <a:t>5 </a:t>
+            </a:r>
+            <a:r>
+              <a:rPr lang="ja-JP" altLang="en-US"/>
+              <a:t>レベル</a:t>
+            </a:r>
+          </a:p>
+        </p:txBody>
+      </p:sp>
+      <p:sp>
+        <p:nvSpPr>
+          <p:cNvPr id="6" name="フッター プレースホルダー 5"/>
+          <p:cNvSpPr>
+            <a:spLocks noGrp="1"/>
+          </p:cNvSpPr>
+          <p:nvPr>
+            <p:ph type="ftr" sz="quarter" idx="4"/>
+          </p:nvPr>
+        </p:nvSpPr>
+        <p:spPr>
+          <a:xfrm>
+            <a:off x="0" y="8685213"/>
+            <a:ext cx="2971800" cy="458787"/>
+          </a:xfrm>
+          <a:prstGeom prst="rect">
+            <a:avLst/>
+          </a:prstGeom>
+        </p:spPr>
+        <p:txBody>
+          <a:bodyPr vert="horz" lIns="91440" tIns="45720" rIns="91440" bIns="45720" rtlCol="0" anchor="b"/>
+          <a:lstStyle>
+            <a:lvl1pPr algn="l">
+              <a:defRPr sz="1200"/>
+            </a:lvl1pPr>
+          </a:lstStyle>
+          <a:p>
+            <a:endParaRPr lang="ja-JP" altLang="en-US"/>
+          </a:p>
+        </p:txBody>
+      </p:sp>
+      <p:sp>
+        <p:nvSpPr>
+          <p:cNvPr id="7" name="スライド番号プレースホルダー 6"/>
+          <p:cNvSpPr>
+            <a:spLocks noGrp="1"/>
+          </p:cNvSpPr>
+          <p:nvPr>
+            <p:ph type="sldNum" sz="quarter" idx="5"/>
+          </p:nvPr>
+        </p:nvSpPr>
+        <p:spPr>
+          <a:xfrm>
+            <a:off x="3884613" y="8685213"/>
+            <a:ext cx="2971800" cy="458787"/>
+          </a:xfrm>
+          <a:prstGeom prst="rect">
+            <a:avLst/>
+          </a:prstGeom>
+        </p:spPr>
+        <p:txBody>
+          <a:bodyPr vert="horz" lIns="91440" tIns="45720" rIns="91440" bIns="45720" rtlCol="0" anchor="b"/>
+          <a:lstStyle>
+            <a:lvl1pPr algn="r">
+              <a:defRPr sz="1200"/>
+            </a:lvl1pPr>
+          </a:lstStyle>
+          <a:p>
+            <a:fld id="{384B12D2-34E3-4D5E-AB8A-E905C3FA2396}" type="slidenum">
+              <a:rPr lang="en-US" altLang="ja-JP"/>
+              <a:t>‹#›</a:t>
+            </a:fld>
+            <a:endParaRPr lang="ja-JP" altLang="en-US"/>
+          </a:p>
+        </p:txBody>
+      </p:sp>
+    </p:spTree>
+    <p:extLst>
+      <p:ext uri="{BB962C8B-B14F-4D97-AF65-F5344CB8AC3E}">
+        <p14:creationId xmlns:p14="http://schemas.microsoft.com/office/powerpoint/2010/main" val="637231089"/>
+      </p:ext>
+    </p:extLst>
+  </p:cSld>
+  <p:clrMap bg1="lt1" tx1="dk1" bg2="lt2" tx2="dk2" accent1="accent1" accent2="accent2" accent3="accent3" accent4="accent4" accent5="accent5" accent6="accent6" hlink="hlink" folHlink="folHlink"/>
+  <p:notesStyle>
+    <a:lvl1pPr marL="0" algn="l" defTabSz="914400" rtl="0" eaLnBrk="1" latinLnBrk="0" hangingPunct="1">
+      <a:defRPr kumimoji="1" sz="1200" kern="1200">
+        <a:solidFill>
+          <a:schemeClr val="tx1"/>
+        </a:solidFill>
+        <a:latin typeface="+mn-lt"/>
+        <a:ea typeface="+mn-ea"/>
+        <a:cs typeface="+mn-cs"/>
+      </a:defRPr>
+    </a:lvl1pPr>
+    <a:lvl2pPr marL="457200" algn="l" defTabSz="914400" rtl="0" eaLnBrk="1" latinLnBrk="0" hangingPunct="1">
+      <a:defRPr kumimoji="1" sz="1200" kern="1200">
+        <a:solidFill>
+          <a:schemeClr val="tx1"/>
+        </a:solidFill>
+        <a:latin typeface="+mn-lt"/>
+        <a:ea typeface="+mn-ea"/>
+        <a:cs typeface="+mn-cs"/>
+      </a:defRPr>
+    </a:lvl2pPr>
+    <a:lvl3pPr marL="914400" algn="l" defTabSz="914400" rtl="0" eaLnBrk="1" latinLnBrk="0" hangingPunct="1">
+      <a:defRPr kumimoji="1" sz="1200" kern="1200">
+        <a:solidFill>
+          <a:schemeClr val="tx1"/>
+        </a:solidFill>
+        <a:latin typeface="+mn-lt"/>
+        <a:ea typeface="+mn-ea"/>
+        <a:cs typeface="+mn-cs"/>
+      </a:defRPr>
+    </a:lvl3pPr>
+    <a:lvl4pPr marL="1371600" algn="l" defTabSz="914400" rtl="0" eaLnBrk="1" latinLnBrk="0" hangingPunct="1">
+      <a:defRPr kumimoji="1" sz="1200" kern="1200">
+        <a:solidFill>
+          <a:schemeClr val="tx1"/>
+        </a:solidFill>
+        <a:latin typeface="+mn-lt"/>
+        <a:ea typeface="+mn-ea"/>
+        <a:cs typeface="+mn-cs"/>
+      </a:defRPr>
+    </a:lvl4pPr>
+    <a:lvl5pPr marL="1828800" algn="l" defTabSz="914400" rtl="0" eaLnBrk="1" latinLnBrk="0" hangingPunct="1">
+      <a:defRPr kumimoji="1" sz="1200" kern="1200">
+        <a:solidFill>
+          <a:schemeClr val="tx1"/>
+        </a:solidFill>
+        <a:latin typeface="+mn-lt"/>
+        <a:ea typeface="+mn-ea"/>
+        <a:cs typeface="+mn-cs"/>
+      </a:defRPr>
+    </a:lvl5pPr>
+    <a:lvl6pPr marL="2286000" algn="l" defTabSz="914400" rtl="0" eaLnBrk="1" latinLnBrk="0" hangingPunct="1">
+      <a:defRPr kumimoji="1" sz="1200" kern="1200">
+        <a:solidFill>
+          <a:schemeClr val="tx1"/>
+        </a:solidFill>
+        <a:latin typeface="+mn-lt"/>
+        <a:ea typeface="+mn-ea"/>
+        <a:cs typeface="+mn-cs"/>
+      </a:defRPr>
+    </a:lvl6pPr>
+    <a:lvl7pPr marL="2743200" algn="l" defTabSz="914400" rtl="0" eaLnBrk="1" latinLnBrk="0" hangingPunct="1">
+      <a:defRPr kumimoji="1" sz="1200" kern="1200">
+        <a:solidFill>
+          <a:schemeClr val="tx1"/>
+        </a:solidFill>
+        <a:latin typeface="+mn-lt"/>
+        <a:ea typeface="+mn-ea"/>
+        <a:cs typeface="+mn-cs"/>
+      </a:defRPr>
+    </a:lvl7pPr>
+    <a:lvl8pPr marL="3200400" algn="l" defTabSz="914400" rtl="0" eaLnBrk="1" latinLnBrk="0" hangingPunct="1">
+      <a:defRPr kumimoji="1" sz="1200" kern="1200">
+        <a:solidFill>
+          <a:schemeClr val="tx1"/>
+        </a:solidFill>
+        <a:latin typeface="+mn-lt"/>
+        <a:ea typeface="+mn-ea"/>
+        <a:cs typeface="+mn-cs"/>
+      </a:defRPr>
+    </a:lvl8pPr>
+    <a:lvl9pPr marL="3657600" algn="l" defTabSz="914400" rtl="0" eaLnBrk="1" latinLnBrk="0" hangingPunct="1">
+      <a:defRPr kumimoji="1" sz="1200" kern="1200">
+        <a:solidFill>
+          <a:schemeClr val="tx1"/>
+        </a:solidFill>
+        <a:latin typeface="+mn-lt"/>
+        <a:ea typeface="+mn-ea"/>
+        <a:cs typeface="+mn-cs"/>
+      </a:defRPr>
+    </a:lvl9pPr>
+  </p:notesStyle>
+</p:notesMaster>
+</file>
+
+<file path=ppt/notesSlides/notesSlide1.xml><?xml version="1.0" encoding="utf-8"?>
+<p:notes xmlns:a="http://schemas.openxmlformats.org/drawingml/2006/main" xmlns:r="http://schemas.openxmlformats.org/officeDocument/2006/relationships" xmlns:p="http://schemas.openxmlformats.org/presentationml/2006/main">
+  <p:cSld>
+    <p:spTree>
+      <p:nvGrpSpPr>
+        <p:cNvPr id="1" name=""/>
+        <p:cNvGrpSpPr/>
+        <p:nvPr/>
+      </p:nvGrpSpPr>
+      <p:grpSpPr>
+        <a:xfrm>
+          <a:off x="0" y="0"/>
+          <a:ext cx="0" cy="0"/>
+          <a:chOff x="0" y="0"/>
+          <a:chExt cx="0" cy="0"/>
+        </a:xfrm>
+      </p:grpSpPr>
+      <p:sp>
+        <p:nvSpPr>
+          <p:cNvPr id="2" name="スライド イメージ プレースホルダー 1"/>
+          <p:cNvSpPr>
+            <a:spLocks noGrp="1" noRot="1" noChangeAspect="1"/>
+          </p:cNvSpPr>
+          <p:nvPr>
+            <p:ph type="sldImg"/>
+          </p:nvPr>
+        </p:nvSpPr>
+        <p:spPr/>
+      </p:sp>
+      <p:sp>
+        <p:nvSpPr>
+          <p:cNvPr id="3" name="ノート プレースホルダー 2"/>
+          <p:cNvSpPr>
+            <a:spLocks noGrp="1"/>
+          </p:cNvSpPr>
+          <p:nvPr>
+            <p:ph type="body" idx="1"/>
+          </p:nvPr>
+        </p:nvSpPr>
+        <p:spPr/>
+        <p:txBody>
+          <a:bodyPr/>
+          <a:lstStyle/>
+          <a:p>
+            <a:endParaRPr lang="ja-JP" altLang="en-US"/>
+          </a:p>
+        </p:txBody>
+      </p:sp>
+      <p:sp>
+        <p:nvSpPr>
+          <p:cNvPr id="4" name="スライド番号プレースホルダー 3"/>
+          <p:cNvSpPr>
+            <a:spLocks noGrp="1"/>
+          </p:cNvSpPr>
+          <p:nvPr>
+            <p:ph type="sldNum" sz="quarter" idx="10"/>
+          </p:nvPr>
+        </p:nvSpPr>
+        <p:spPr/>
+        <p:txBody>
+          <a:bodyPr/>
+          <a:lstStyle/>
+          <a:p>
+            <a:fld id="{384B12D2-34E3-4D5E-AB8A-E905C3FA2396}" type="slidenum">
+              <a:rPr lang="en-US" altLang="ja-JP"/>
+              <a:t>‹#›</a:t>
+            </a:fld>
+            <a:endParaRPr lang="ja-JP" altLang="en-US"/>
+          </a:p>
+        </p:txBody>
+      </p:sp>
+    </p:spTree>
+    <p:extLst>
+      <p:ext uri="{BB962C8B-B14F-4D97-AF65-F5344CB8AC3E}">
+        <p14:creationId xmlns:p14="http://schemas.microsoft.com/office/powerpoint/2010/main" val="3053890731"/>
+      </p:ext>
+    </p:extLst>
+  </p:cSld>
+  <p:clrMapOvr>
+    <a:masterClrMapping/>
+  </p:clrMapOvr>
+</p:notes>
 </file>
 
 <file path=ppt/slideLayouts/slideLayout1.xml><?xml version="1.0" encoding="utf-8"?>
@@ -714,7 +1188,7 @@
           </a:lstStyle>
           <a:p>
             <a:r>
-              <a:rPr lang="ja-JP" altLang="en-US" smtClean="0"/>
+              <a:rPr lang="ja-JP" altLang="en-US"/>
               <a:t>マスター タイトルの書式設定</a:t>
             </a:r>
             <a:endParaRPr lang="en-US" dirty="0"/>
@@ -834,7 +1308,7 @@
           </a:lstStyle>
           <a:p>
             <a:r>
-              <a:rPr lang="ja-JP" altLang="en-US" smtClean="0"/>
+              <a:rPr lang="ja-JP" altLang="en-US"/>
               <a:t>マスター サブタイトルの書式設定</a:t>
             </a:r>
             <a:endParaRPr lang="en-US" dirty="0"/>
@@ -859,7 +1333,7 @@
             <a:fld id="{B61BEF0D-F0BB-DE4B-95CE-6DB70DBA9567}" type="datetimeFigureOut">
               <a:rPr lang="en-US" dirty="0"/>
               <a:pPr/>
-              <a:t>5/4/2016</a:t>
+              <a:t>5/16/2016</a:t>
             </a:fld>
             <a:endParaRPr lang="en-US" dirty="0"/>
           </a:p>
@@ -960,7 +1434,7 @@
           </a:lstStyle>
           <a:p>
             <a:r>
-              <a:rPr lang="ja-JP" altLang="en-US" smtClean="0"/>
+              <a:rPr lang="ja-JP" altLang="en-US"/>
               <a:t>マスター タイトルの書式設定</a:t>
             </a:r>
             <a:endParaRPr lang="en-US" dirty="0"/>
@@ -1083,7 +1557,7 @@
           <a:p>
             <a:pPr lvl="0"/>
             <a:r>
-              <a:rPr lang="ja-JP" altLang="en-US" smtClean="0"/>
+              <a:rPr lang="ja-JP" altLang="en-US"/>
               <a:t>マスター テキストの書式設定</a:t>
             </a:r>
           </a:p>
@@ -1107,7 +1581,7 @@
             <a:fld id="{B61BEF0D-F0BB-DE4B-95CE-6DB70DBA9567}" type="datetimeFigureOut">
               <a:rPr lang="en-US" dirty="0"/>
               <a:pPr/>
-              <a:t>5/4/2016</a:t>
+              <a:t>5/16/2016</a:t>
             </a:fld>
             <a:endParaRPr lang="en-US" dirty="0"/>
           </a:p>
@@ -1208,7 +1682,7 @@
           </a:lstStyle>
           <a:p>
             <a:r>
-              <a:rPr lang="ja-JP" altLang="en-US" smtClean="0"/>
+              <a:rPr lang="ja-JP" altLang="en-US"/>
               <a:t>マスター タイトルの書式設定</a:t>
             </a:r>
             <a:endParaRPr lang="en-US" dirty="0"/>
@@ -1272,7 +1746,7 @@
           <a:p>
             <a:pPr lvl="0"/>
             <a:r>
-              <a:rPr lang="ja-JP" altLang="en-US" smtClean="0"/>
+              <a:rPr lang="ja-JP" altLang="en-US"/>
               <a:t>マスター テキストの書式設定</a:t>
             </a:r>
           </a:p>
@@ -1394,7 +1868,7 @@
           <a:p>
             <a:pPr lvl="0"/>
             <a:r>
-              <a:rPr lang="ja-JP" altLang="en-US" smtClean="0"/>
+              <a:rPr lang="ja-JP" altLang="en-US"/>
               <a:t>マスター テキストの書式設定</a:t>
             </a:r>
           </a:p>
@@ -1418,7 +1892,7 @@
             <a:fld id="{B61BEF0D-F0BB-DE4B-95CE-6DB70DBA9567}" type="datetimeFigureOut">
               <a:rPr lang="en-US" dirty="0"/>
               <a:pPr/>
-              <a:t>5/4/2016</a:t>
+              <a:t>5/16/2016</a:t>
             </a:fld>
             <a:endParaRPr lang="en-US" dirty="0"/>
           </a:p>
@@ -1601,7 +2075,7 @@
           </a:lstStyle>
           <a:p>
             <a:r>
-              <a:rPr lang="ja-JP" altLang="en-US" smtClean="0"/>
+              <a:rPr lang="ja-JP" altLang="en-US"/>
               <a:t>マスター タイトルの書式設定</a:t>
             </a:r>
             <a:endParaRPr lang="en-US" dirty="0"/>
@@ -1724,7 +2198,7 @@
           <a:p>
             <a:pPr lvl="0"/>
             <a:r>
-              <a:rPr lang="ja-JP" altLang="en-US" smtClean="0"/>
+              <a:rPr lang="ja-JP" altLang="en-US"/>
               <a:t>マスター テキストの書式設定</a:t>
             </a:r>
           </a:p>
@@ -1748,7 +2222,7 @@
             <a:fld id="{B61BEF0D-F0BB-DE4B-95CE-6DB70DBA9567}" type="datetimeFigureOut">
               <a:rPr lang="en-US" dirty="0"/>
               <a:pPr/>
-              <a:t>5/4/2016</a:t>
+              <a:t>5/16/2016</a:t>
             </a:fld>
             <a:endParaRPr lang="en-US" dirty="0"/>
           </a:p>
@@ -1849,7 +2323,7 @@
           </a:lstStyle>
           <a:p>
             <a:r>
-              <a:rPr lang="ja-JP" altLang="en-US" smtClean="0"/>
+              <a:rPr lang="ja-JP" altLang="en-US"/>
               <a:t>マスター タイトルの書式設定</a:t>
             </a:r>
             <a:endParaRPr lang="en-US" dirty="0"/>
@@ -1913,7 +2387,7 @@
           <a:p>
             <a:pPr lvl="0"/>
             <a:r>
-              <a:rPr lang="ja-JP" altLang="en-US" smtClean="0"/>
+              <a:rPr lang="ja-JP" altLang="en-US"/>
               <a:t>マスター テキストの書式設定</a:t>
             </a:r>
           </a:p>
@@ -2035,7 +2509,7 @@
           <a:p>
             <a:pPr lvl="0"/>
             <a:r>
-              <a:rPr lang="ja-JP" altLang="en-US" smtClean="0"/>
+              <a:rPr lang="ja-JP" altLang="en-US"/>
               <a:t>マスター テキストの書式設定</a:t>
             </a:r>
           </a:p>
@@ -2059,7 +2533,7 @@
             <a:fld id="{B61BEF0D-F0BB-DE4B-95CE-6DB70DBA9567}" type="datetimeFigureOut">
               <a:rPr lang="en-US" dirty="0"/>
               <a:pPr/>
-              <a:t>5/4/2016</a:t>
+              <a:t>5/16/2016</a:t>
             </a:fld>
             <a:endParaRPr lang="en-US" dirty="0"/>
           </a:p>
@@ -2242,7 +2716,7 @@
           </a:lstStyle>
           <a:p>
             <a:r>
-              <a:rPr lang="ja-JP" altLang="en-US" smtClean="0"/>
+              <a:rPr lang="ja-JP" altLang="en-US"/>
               <a:t>マスター タイトルの書式設定</a:t>
             </a:r>
             <a:endParaRPr lang="en-US" dirty="0"/>
@@ -2303,7 +2777,7 @@
           <a:p>
             <a:pPr lvl="0"/>
             <a:r>
-              <a:rPr lang="ja-JP" altLang="en-US" smtClean="0"/>
+              <a:rPr lang="ja-JP" altLang="en-US"/>
               <a:t>マスター テキストの書式設定</a:t>
             </a:r>
           </a:p>
@@ -2425,7 +2899,7 @@
           <a:p>
             <a:pPr lvl="0"/>
             <a:r>
-              <a:rPr lang="ja-JP" altLang="en-US" smtClean="0"/>
+              <a:rPr lang="ja-JP" altLang="en-US"/>
               <a:t>マスター テキストの書式設定</a:t>
             </a:r>
           </a:p>
@@ -2449,7 +2923,7 @@
             <a:fld id="{B61BEF0D-F0BB-DE4B-95CE-6DB70DBA9567}" type="datetimeFigureOut">
               <a:rPr lang="en-US" dirty="0"/>
               <a:pPr/>
-              <a:t>5/4/2016</a:t>
+              <a:t>5/16/2016</a:t>
             </a:fld>
             <a:endParaRPr lang="en-US" dirty="0"/>
           </a:p>
@@ -2539,7 +3013,7 @@
           <a:lstStyle/>
           <a:p>
             <a:r>
-              <a:rPr lang="ja-JP" altLang="en-US" smtClean="0"/>
+              <a:rPr lang="ja-JP" altLang="en-US"/>
               <a:t>マスター タイトルの書式設定</a:t>
             </a:r>
             <a:endParaRPr lang="en-US" dirty="0"/>
@@ -2563,67 +3037,67 @@
           <a:p>
             <a:pPr lvl="0"/>
             <a:r>
-              <a:rPr lang="ja-JP" altLang="en-US" smtClean="0"/>
+              <a:rPr lang="ja-JP" altLang="en-US"/>
               <a:t>マスター テキストの書式設定</a:t>
             </a:r>
           </a:p>
           <a:p>
             <a:pPr lvl="1"/>
             <a:r>
-              <a:rPr lang="ja-JP" altLang="en-US" smtClean="0"/>
+              <a:rPr lang="ja-JP" altLang="en-US"/>
               <a:t>第 </a:t>
             </a:r>
             <a:r>
-              <a:rPr lang="en-US" altLang="ja-JP" smtClean="0"/>
+              <a:rPr lang="en-US" altLang="ja-JP"/>
               <a:t>2 </a:t>
             </a:r>
             <a:r>
-              <a:rPr lang="ja-JP" altLang="en-US" smtClean="0"/>
+              <a:rPr lang="ja-JP" altLang="en-US"/>
               <a:t>レベル</a:t>
             </a:r>
           </a:p>
           <a:p>
             <a:pPr lvl="2"/>
             <a:r>
-              <a:rPr lang="ja-JP" altLang="en-US" smtClean="0"/>
+              <a:rPr lang="ja-JP" altLang="en-US"/>
               <a:t>第 </a:t>
             </a:r>
             <a:r>
-              <a:rPr lang="en-US" altLang="ja-JP" smtClean="0"/>
+              <a:rPr lang="en-US" altLang="ja-JP"/>
               <a:t>3 </a:t>
             </a:r>
             <a:r>
-              <a:rPr lang="ja-JP" altLang="en-US" smtClean="0"/>
+              <a:rPr lang="ja-JP" altLang="en-US"/>
               <a:t>レベル</a:t>
             </a:r>
           </a:p>
           <a:p>
             <a:pPr lvl="3"/>
             <a:r>
-              <a:rPr lang="ja-JP" altLang="en-US" smtClean="0"/>
+              <a:rPr lang="ja-JP" altLang="en-US"/>
               <a:t>第 </a:t>
             </a:r>
             <a:r>
-              <a:rPr lang="en-US" altLang="ja-JP" smtClean="0"/>
+              <a:rPr lang="en-US" altLang="ja-JP"/>
               <a:t>4 </a:t>
             </a:r>
             <a:r>
-              <a:rPr lang="ja-JP" altLang="en-US" smtClean="0"/>
+              <a:rPr lang="ja-JP" altLang="en-US"/>
               <a:t>レベル</a:t>
             </a:r>
           </a:p>
           <a:p>
             <a:pPr lvl="4"/>
             <a:r>
-              <a:rPr lang="ja-JP" altLang="en-US" smtClean="0"/>
+              <a:rPr lang="ja-JP" altLang="en-US"/>
               <a:t>第 </a:t>
             </a:r>
             <a:r>
-              <a:rPr lang="en-US" altLang="ja-JP" smtClean="0"/>
+              <a:rPr lang="en-US" altLang="ja-JP"/>
               <a:t>5 </a:t>
             </a:r>
             <a:r>
-              <a:rPr lang="ja-JP" altLang="en-US" smtClean="0"/>
+              <a:rPr lang="ja-JP" altLang="en-US"/>
               <a:t>レベル</a:t>
             </a:r>
             <a:endParaRPr lang="en-US" dirty="0"/>
@@ -2647,7 +3121,7 @@
           <a:p>
             <a:fld id="{55C6B4A9-1611-4792-9094-5F34BCA07E0B}" type="datetimeFigureOut">
               <a:rPr lang="en-US" dirty="0"/>
-              <a:t>5/4/2016</a:t>
+              <a:t>5/16/2016</a:t>
             </a:fld>
             <a:endParaRPr lang="en-US" dirty="0"/>
           </a:p>
@@ -2741,7 +3215,7 @@
           <a:lstStyle/>
           <a:p>
             <a:r>
-              <a:rPr lang="ja-JP" altLang="en-US" smtClean="0"/>
+              <a:rPr lang="ja-JP" altLang="en-US"/>
               <a:t>マスター タイトルの書式設定</a:t>
             </a:r>
             <a:endParaRPr lang="en-US" dirty="0"/>
@@ -2770,67 +3244,67 @@
           <a:p>
             <a:pPr lvl="0"/>
             <a:r>
-              <a:rPr lang="ja-JP" altLang="en-US" smtClean="0"/>
+              <a:rPr lang="ja-JP" altLang="en-US"/>
               <a:t>マスター テキストの書式設定</a:t>
             </a:r>
           </a:p>
           <a:p>
             <a:pPr lvl="1"/>
             <a:r>
-              <a:rPr lang="ja-JP" altLang="en-US" smtClean="0"/>
+              <a:rPr lang="ja-JP" altLang="en-US"/>
               <a:t>第 </a:t>
             </a:r>
             <a:r>
-              <a:rPr lang="en-US" altLang="ja-JP" smtClean="0"/>
+              <a:rPr lang="en-US" altLang="ja-JP"/>
               <a:t>2 </a:t>
             </a:r>
             <a:r>
-              <a:rPr lang="ja-JP" altLang="en-US" smtClean="0"/>
+              <a:rPr lang="ja-JP" altLang="en-US"/>
               <a:t>レベル</a:t>
             </a:r>
           </a:p>
           <a:p>
             <a:pPr lvl="2"/>
             <a:r>
-              <a:rPr lang="ja-JP" altLang="en-US" smtClean="0"/>
+              <a:rPr lang="ja-JP" altLang="en-US"/>
               <a:t>第 </a:t>
             </a:r>
             <a:r>
-              <a:rPr lang="en-US" altLang="ja-JP" smtClean="0"/>
+              <a:rPr lang="en-US" altLang="ja-JP"/>
               <a:t>3 </a:t>
             </a:r>
             <a:r>
-              <a:rPr lang="ja-JP" altLang="en-US" smtClean="0"/>
+              <a:rPr lang="ja-JP" altLang="en-US"/>
               <a:t>レベル</a:t>
             </a:r>
           </a:p>
           <a:p>
             <a:pPr lvl="3"/>
             <a:r>
-              <a:rPr lang="ja-JP" altLang="en-US" smtClean="0"/>
+              <a:rPr lang="ja-JP" altLang="en-US"/>
               <a:t>第 </a:t>
             </a:r>
             <a:r>
-              <a:rPr lang="en-US" altLang="ja-JP" smtClean="0"/>
+              <a:rPr lang="en-US" altLang="ja-JP"/>
               <a:t>4 </a:t>
             </a:r>
             <a:r>
-              <a:rPr lang="ja-JP" altLang="en-US" smtClean="0"/>
+              <a:rPr lang="ja-JP" altLang="en-US"/>
               <a:t>レベル</a:t>
             </a:r>
           </a:p>
           <a:p>
             <a:pPr lvl="4"/>
             <a:r>
-              <a:rPr lang="ja-JP" altLang="en-US" smtClean="0"/>
+              <a:rPr lang="ja-JP" altLang="en-US"/>
               <a:t>第 </a:t>
             </a:r>
             <a:r>
-              <a:rPr lang="en-US" altLang="ja-JP" smtClean="0"/>
+              <a:rPr lang="en-US" altLang="ja-JP"/>
               <a:t>5 </a:t>
             </a:r>
             <a:r>
-              <a:rPr lang="ja-JP" altLang="en-US" smtClean="0"/>
+              <a:rPr lang="ja-JP" altLang="en-US"/>
               <a:t>レベル</a:t>
             </a:r>
             <a:endParaRPr lang="en-US" dirty="0"/>
@@ -2855,7 +3329,7 @@
             <a:fld id="{B61BEF0D-F0BB-DE4B-95CE-6DB70DBA9567}" type="datetimeFigureOut">
               <a:rPr lang="en-US" dirty="0"/>
               <a:pPr/>
-              <a:t>5/4/2016</a:t>
+              <a:t>5/16/2016</a:t>
             </a:fld>
             <a:endParaRPr lang="en-US" dirty="0"/>
           </a:p>
@@ -2945,7 +3419,7 @@
           <a:lstStyle/>
           <a:p>
             <a:r>
-              <a:rPr lang="ja-JP" altLang="en-US" smtClean="0"/>
+              <a:rPr lang="ja-JP" altLang="en-US"/>
               <a:t>マスター タイトルの書式設定</a:t>
             </a:r>
             <a:endParaRPr lang="en-US" dirty="0"/>
@@ -2969,67 +3443,67 @@
           <a:p>
             <a:pPr lvl="0"/>
             <a:r>
-              <a:rPr lang="ja-JP" altLang="en-US" smtClean="0"/>
+              <a:rPr lang="ja-JP" altLang="en-US"/>
               <a:t>マスター テキストの書式設定</a:t>
             </a:r>
           </a:p>
           <a:p>
             <a:pPr lvl="1"/>
             <a:r>
-              <a:rPr lang="ja-JP" altLang="en-US" smtClean="0"/>
+              <a:rPr lang="ja-JP" altLang="en-US"/>
               <a:t>第 </a:t>
             </a:r>
             <a:r>
-              <a:rPr lang="en-US" altLang="ja-JP" smtClean="0"/>
+              <a:rPr lang="en-US" altLang="ja-JP"/>
               <a:t>2 </a:t>
             </a:r>
             <a:r>
-              <a:rPr lang="ja-JP" altLang="en-US" smtClean="0"/>
+              <a:rPr lang="ja-JP" altLang="en-US"/>
               <a:t>レベル</a:t>
             </a:r>
           </a:p>
           <a:p>
             <a:pPr lvl="2"/>
             <a:r>
-              <a:rPr lang="ja-JP" altLang="en-US" smtClean="0"/>
+              <a:rPr lang="ja-JP" altLang="en-US"/>
               <a:t>第 </a:t>
             </a:r>
             <a:r>
-              <a:rPr lang="en-US" altLang="ja-JP" smtClean="0"/>
+              <a:rPr lang="en-US" altLang="ja-JP"/>
               <a:t>3 </a:t>
             </a:r>
             <a:r>
-              <a:rPr lang="ja-JP" altLang="en-US" smtClean="0"/>
+              <a:rPr lang="ja-JP" altLang="en-US"/>
               <a:t>レベル</a:t>
             </a:r>
           </a:p>
           <a:p>
             <a:pPr lvl="3"/>
             <a:r>
-              <a:rPr lang="ja-JP" altLang="en-US" smtClean="0"/>
+              <a:rPr lang="ja-JP" altLang="en-US"/>
               <a:t>第 </a:t>
             </a:r>
             <a:r>
-              <a:rPr lang="en-US" altLang="ja-JP" smtClean="0"/>
+              <a:rPr lang="en-US" altLang="ja-JP"/>
               <a:t>4 </a:t>
             </a:r>
             <a:r>
-              <a:rPr lang="ja-JP" altLang="en-US" smtClean="0"/>
+              <a:rPr lang="ja-JP" altLang="en-US"/>
               <a:t>レベル</a:t>
             </a:r>
           </a:p>
           <a:p>
             <a:pPr lvl="4"/>
             <a:r>
-              <a:rPr lang="ja-JP" altLang="en-US" smtClean="0"/>
+              <a:rPr lang="ja-JP" altLang="en-US"/>
               <a:t>第 </a:t>
             </a:r>
             <a:r>
-              <a:rPr lang="en-US" altLang="ja-JP" smtClean="0"/>
+              <a:rPr lang="en-US" altLang="ja-JP"/>
               <a:t>5 </a:t>
             </a:r>
             <a:r>
-              <a:rPr lang="ja-JP" altLang="en-US" smtClean="0"/>
+              <a:rPr lang="ja-JP" altLang="en-US"/>
               <a:t>レベル</a:t>
             </a:r>
             <a:endParaRPr lang="en-US" dirty="0"/>
@@ -3053,7 +3527,7 @@
           <a:p>
             <a:fld id="{42A54C80-263E-416B-A8E0-580EDEADCBDC}" type="datetimeFigureOut">
               <a:rPr lang="en-US" dirty="0"/>
-              <a:t>5/4/2016</a:t>
+              <a:t>5/16/2016</a:t>
             </a:fld>
             <a:endParaRPr lang="en-US" dirty="0"/>
           </a:p>
@@ -3151,7 +3625,7 @@
           </a:lstStyle>
           <a:p>
             <a:r>
-              <a:rPr lang="ja-JP" altLang="en-US" smtClean="0"/>
+              <a:rPr lang="ja-JP" altLang="en-US"/>
               <a:t>マスター タイトルの書式設定</a:t>
             </a:r>
             <a:endParaRPr lang="en-US" dirty="0"/>
@@ -3272,7 +3746,7 @@
           <a:p>
             <a:pPr lvl="0"/>
             <a:r>
-              <a:rPr lang="ja-JP" altLang="en-US" smtClean="0"/>
+              <a:rPr lang="ja-JP" altLang="en-US"/>
               <a:t>マスター テキストの書式設定</a:t>
             </a:r>
           </a:p>
@@ -3296,7 +3770,7 @@
             <a:fld id="{B61BEF0D-F0BB-DE4B-95CE-6DB70DBA9567}" type="datetimeFigureOut">
               <a:rPr lang="en-US" dirty="0"/>
               <a:pPr/>
-              <a:t>5/4/2016</a:t>
+              <a:t>5/16/2016</a:t>
             </a:fld>
             <a:endParaRPr lang="en-US" dirty="0"/>
           </a:p>
@@ -3386,7 +3860,7 @@
           <a:lstStyle/>
           <a:p>
             <a:r>
-              <a:rPr lang="ja-JP" altLang="en-US" smtClean="0"/>
+              <a:rPr lang="ja-JP" altLang="en-US"/>
               <a:t>マスター タイトルの書式設定</a:t>
             </a:r>
             <a:endParaRPr lang="en-US" dirty="0"/>
@@ -3415,67 +3889,67 @@
           <a:p>
             <a:pPr lvl="0"/>
             <a:r>
-              <a:rPr lang="ja-JP" altLang="en-US" smtClean="0"/>
+              <a:rPr lang="ja-JP" altLang="en-US"/>
               <a:t>マスター テキストの書式設定</a:t>
             </a:r>
           </a:p>
           <a:p>
             <a:pPr lvl="1"/>
             <a:r>
-              <a:rPr lang="ja-JP" altLang="en-US" smtClean="0"/>
+              <a:rPr lang="ja-JP" altLang="en-US"/>
               <a:t>第 </a:t>
             </a:r>
             <a:r>
-              <a:rPr lang="en-US" altLang="ja-JP" smtClean="0"/>
+              <a:rPr lang="en-US" altLang="ja-JP"/>
               <a:t>2 </a:t>
             </a:r>
             <a:r>
-              <a:rPr lang="ja-JP" altLang="en-US" smtClean="0"/>
+              <a:rPr lang="ja-JP" altLang="en-US"/>
               <a:t>レベル</a:t>
             </a:r>
           </a:p>
           <a:p>
             <a:pPr lvl="2"/>
             <a:r>
-              <a:rPr lang="ja-JP" altLang="en-US" smtClean="0"/>
+              <a:rPr lang="ja-JP" altLang="en-US"/>
               <a:t>第 </a:t>
             </a:r>
             <a:r>
-              <a:rPr lang="en-US" altLang="ja-JP" smtClean="0"/>
+              <a:rPr lang="en-US" altLang="ja-JP"/>
               <a:t>3 </a:t>
             </a:r>
             <a:r>
-              <a:rPr lang="ja-JP" altLang="en-US" smtClean="0"/>
+              <a:rPr lang="ja-JP" altLang="en-US"/>
               <a:t>レベル</a:t>
             </a:r>
           </a:p>
           <a:p>
             <a:pPr lvl="3"/>
             <a:r>
-              <a:rPr lang="ja-JP" altLang="en-US" smtClean="0"/>
+              <a:rPr lang="ja-JP" altLang="en-US"/>
               <a:t>第 </a:t>
             </a:r>
             <a:r>
-              <a:rPr lang="en-US" altLang="ja-JP" smtClean="0"/>
+              <a:rPr lang="en-US" altLang="ja-JP"/>
               <a:t>4 </a:t>
             </a:r>
             <a:r>
-              <a:rPr lang="ja-JP" altLang="en-US" smtClean="0"/>
+              <a:rPr lang="ja-JP" altLang="en-US"/>
               <a:t>レベル</a:t>
             </a:r>
           </a:p>
           <a:p>
             <a:pPr lvl="4"/>
             <a:r>
-              <a:rPr lang="ja-JP" altLang="en-US" smtClean="0"/>
+              <a:rPr lang="ja-JP" altLang="en-US"/>
               <a:t>第 </a:t>
             </a:r>
             <a:r>
-              <a:rPr lang="en-US" altLang="ja-JP" smtClean="0"/>
+              <a:rPr lang="en-US" altLang="ja-JP"/>
               <a:t>5 </a:t>
             </a:r>
             <a:r>
-              <a:rPr lang="ja-JP" altLang="en-US" smtClean="0"/>
+              <a:rPr lang="ja-JP" altLang="en-US"/>
               <a:t>レベル</a:t>
             </a:r>
             <a:endParaRPr lang="en-US" dirty="0"/>
@@ -3504,67 +3978,67 @@
           <a:p>
             <a:pPr lvl="0"/>
             <a:r>
-              <a:rPr lang="ja-JP" altLang="en-US" smtClean="0"/>
+              <a:rPr lang="ja-JP" altLang="en-US"/>
               <a:t>マスター テキストの書式設定</a:t>
             </a:r>
           </a:p>
           <a:p>
             <a:pPr lvl="1"/>
             <a:r>
-              <a:rPr lang="ja-JP" altLang="en-US" smtClean="0"/>
+              <a:rPr lang="ja-JP" altLang="en-US"/>
               <a:t>第 </a:t>
             </a:r>
             <a:r>
-              <a:rPr lang="en-US" altLang="ja-JP" smtClean="0"/>
+              <a:rPr lang="en-US" altLang="ja-JP"/>
               <a:t>2 </a:t>
             </a:r>
             <a:r>
-              <a:rPr lang="ja-JP" altLang="en-US" smtClean="0"/>
+              <a:rPr lang="ja-JP" altLang="en-US"/>
               <a:t>レベル</a:t>
             </a:r>
           </a:p>
           <a:p>
             <a:pPr lvl="2"/>
             <a:r>
-              <a:rPr lang="ja-JP" altLang="en-US" smtClean="0"/>
+              <a:rPr lang="ja-JP" altLang="en-US"/>
               <a:t>第 </a:t>
             </a:r>
             <a:r>
-              <a:rPr lang="en-US" altLang="ja-JP" smtClean="0"/>
+              <a:rPr lang="en-US" altLang="ja-JP"/>
               <a:t>3 </a:t>
             </a:r>
             <a:r>
-              <a:rPr lang="ja-JP" altLang="en-US" smtClean="0"/>
+              <a:rPr lang="ja-JP" altLang="en-US"/>
               <a:t>レベル</a:t>
             </a:r>
           </a:p>
           <a:p>
             <a:pPr lvl="3"/>
             <a:r>
-              <a:rPr lang="ja-JP" altLang="en-US" smtClean="0"/>
+              <a:rPr lang="ja-JP" altLang="en-US"/>
               <a:t>第 </a:t>
             </a:r>
             <a:r>
-              <a:rPr lang="en-US" altLang="ja-JP" smtClean="0"/>
+              <a:rPr lang="en-US" altLang="ja-JP"/>
               <a:t>4 </a:t>
             </a:r>
             <a:r>
-              <a:rPr lang="ja-JP" altLang="en-US" smtClean="0"/>
+              <a:rPr lang="ja-JP" altLang="en-US"/>
               <a:t>レベル</a:t>
             </a:r>
           </a:p>
           <a:p>
             <a:pPr lvl="4"/>
             <a:r>
-              <a:rPr lang="ja-JP" altLang="en-US" smtClean="0"/>
+              <a:rPr lang="ja-JP" altLang="en-US"/>
               <a:t>第 </a:t>
             </a:r>
             <a:r>
-              <a:rPr lang="en-US" altLang="ja-JP" smtClean="0"/>
+              <a:rPr lang="en-US" altLang="ja-JP"/>
               <a:t>5 </a:t>
             </a:r>
             <a:r>
-              <a:rPr lang="ja-JP" altLang="en-US" smtClean="0"/>
+              <a:rPr lang="ja-JP" altLang="en-US"/>
               <a:t>レベル</a:t>
             </a:r>
             <a:endParaRPr lang="en-US" dirty="0"/>
@@ -3588,7 +4062,7 @@
           <a:p>
             <a:fld id="{42A54C80-263E-416B-A8E0-580EDEADCBDC}" type="datetimeFigureOut">
               <a:rPr lang="en-US" dirty="0"/>
-              <a:t>5/4/2016</a:t>
+              <a:t>5/16/2016</a:t>
             </a:fld>
             <a:endParaRPr lang="en-US" dirty="0"/>
           </a:p>
@@ -3681,7 +4155,7 @@
           </a:lstStyle>
           <a:p>
             <a:r>
-              <a:rPr lang="ja-JP" altLang="en-US" smtClean="0"/>
+              <a:rPr lang="ja-JP" altLang="en-US"/>
               <a:t>マスター タイトルの書式設定</a:t>
             </a:r>
             <a:endParaRPr lang="en-US" dirty="0"/>
@@ -3749,7 +4223,7 @@
           <a:p>
             <a:pPr lvl="0"/>
             <a:r>
-              <a:rPr lang="ja-JP" altLang="en-US" smtClean="0"/>
+              <a:rPr lang="ja-JP" altLang="en-US"/>
               <a:t>マスター テキストの書式設定</a:t>
             </a:r>
           </a:p>
@@ -3779,67 +4253,67 @@
           <a:p>
             <a:pPr lvl="0"/>
             <a:r>
-              <a:rPr lang="ja-JP" altLang="en-US" smtClean="0"/>
+              <a:rPr lang="ja-JP" altLang="en-US"/>
               <a:t>マスター テキストの書式設定</a:t>
             </a:r>
           </a:p>
           <a:p>
             <a:pPr lvl="1"/>
             <a:r>
-              <a:rPr lang="ja-JP" altLang="en-US" smtClean="0"/>
+              <a:rPr lang="ja-JP" altLang="en-US"/>
               <a:t>第 </a:t>
             </a:r>
             <a:r>
-              <a:rPr lang="en-US" altLang="ja-JP" smtClean="0"/>
+              <a:rPr lang="en-US" altLang="ja-JP"/>
               <a:t>2 </a:t>
             </a:r>
             <a:r>
-              <a:rPr lang="ja-JP" altLang="en-US" smtClean="0"/>
+              <a:rPr lang="ja-JP" altLang="en-US"/>
               <a:t>レベル</a:t>
             </a:r>
           </a:p>
           <a:p>
             <a:pPr lvl="2"/>
             <a:r>
-              <a:rPr lang="ja-JP" altLang="en-US" smtClean="0"/>
+              <a:rPr lang="ja-JP" altLang="en-US"/>
               <a:t>第 </a:t>
             </a:r>
             <a:r>
-              <a:rPr lang="en-US" altLang="ja-JP" smtClean="0"/>
+              <a:rPr lang="en-US" altLang="ja-JP"/>
               <a:t>3 </a:t>
             </a:r>
             <a:r>
-              <a:rPr lang="ja-JP" altLang="en-US" smtClean="0"/>
+              <a:rPr lang="ja-JP" altLang="en-US"/>
               <a:t>レベル</a:t>
             </a:r>
           </a:p>
           <a:p>
             <a:pPr lvl="3"/>
             <a:r>
-              <a:rPr lang="ja-JP" altLang="en-US" smtClean="0"/>
+              <a:rPr lang="ja-JP" altLang="en-US"/>
               <a:t>第 </a:t>
             </a:r>
             <a:r>
-              <a:rPr lang="en-US" altLang="ja-JP" smtClean="0"/>
+              <a:rPr lang="en-US" altLang="ja-JP"/>
               <a:t>4 </a:t>
             </a:r>
             <a:r>
-              <a:rPr lang="ja-JP" altLang="en-US" smtClean="0"/>
+              <a:rPr lang="ja-JP" altLang="en-US"/>
               <a:t>レベル</a:t>
             </a:r>
           </a:p>
           <a:p>
             <a:pPr lvl="4"/>
             <a:r>
-              <a:rPr lang="ja-JP" altLang="en-US" smtClean="0"/>
+              <a:rPr lang="ja-JP" altLang="en-US"/>
               <a:t>第 </a:t>
             </a:r>
             <a:r>
-              <a:rPr lang="en-US" altLang="ja-JP" smtClean="0"/>
+              <a:rPr lang="en-US" altLang="ja-JP"/>
               <a:t>5 </a:t>
             </a:r>
             <a:r>
-              <a:rPr lang="ja-JP" altLang="en-US" smtClean="0"/>
+              <a:rPr lang="ja-JP" altLang="en-US"/>
               <a:t>レベル</a:t>
             </a:r>
             <a:endParaRPr lang="en-US" dirty="0"/>
@@ -3907,7 +4381,7 @@
           <a:p>
             <a:pPr lvl="0"/>
             <a:r>
-              <a:rPr lang="ja-JP" altLang="en-US" smtClean="0"/>
+              <a:rPr lang="ja-JP" altLang="en-US"/>
               <a:t>マスター テキストの書式設定</a:t>
             </a:r>
           </a:p>
@@ -3937,67 +4411,67 @@
           <a:p>
             <a:pPr lvl="0"/>
             <a:r>
-              <a:rPr lang="ja-JP" altLang="en-US" smtClean="0"/>
+              <a:rPr lang="ja-JP" altLang="en-US"/>
               <a:t>マスター テキストの書式設定</a:t>
             </a:r>
           </a:p>
           <a:p>
             <a:pPr lvl="1"/>
             <a:r>
-              <a:rPr lang="ja-JP" altLang="en-US" smtClean="0"/>
+              <a:rPr lang="ja-JP" altLang="en-US"/>
               <a:t>第 </a:t>
             </a:r>
             <a:r>
-              <a:rPr lang="en-US" altLang="ja-JP" smtClean="0"/>
+              <a:rPr lang="en-US" altLang="ja-JP"/>
               <a:t>2 </a:t>
             </a:r>
             <a:r>
-              <a:rPr lang="ja-JP" altLang="en-US" smtClean="0"/>
+              <a:rPr lang="ja-JP" altLang="en-US"/>
               <a:t>レベル</a:t>
             </a:r>
           </a:p>
           <a:p>
             <a:pPr lvl="2"/>
             <a:r>
-              <a:rPr lang="ja-JP" altLang="en-US" smtClean="0"/>
+              <a:rPr lang="ja-JP" altLang="en-US"/>
               <a:t>第 </a:t>
             </a:r>
             <a:r>
-              <a:rPr lang="en-US" altLang="ja-JP" smtClean="0"/>
+              <a:rPr lang="en-US" altLang="ja-JP"/>
               <a:t>3 </a:t>
             </a:r>
             <a:r>
-              <a:rPr lang="ja-JP" altLang="en-US" smtClean="0"/>
+              <a:rPr lang="ja-JP" altLang="en-US"/>
               <a:t>レベル</a:t>
             </a:r>
           </a:p>
           <a:p>
             <a:pPr lvl="3"/>
             <a:r>
-              <a:rPr lang="ja-JP" altLang="en-US" smtClean="0"/>
+              <a:rPr lang="ja-JP" altLang="en-US"/>
               <a:t>第 </a:t>
             </a:r>
             <a:r>
-              <a:rPr lang="en-US" altLang="ja-JP" smtClean="0"/>
+              <a:rPr lang="en-US" altLang="ja-JP"/>
               <a:t>4 </a:t>
             </a:r>
             <a:r>
-              <a:rPr lang="ja-JP" altLang="en-US" smtClean="0"/>
+              <a:rPr lang="ja-JP" altLang="en-US"/>
               <a:t>レベル</a:t>
             </a:r>
           </a:p>
           <a:p>
             <a:pPr lvl="4"/>
             <a:r>
-              <a:rPr lang="ja-JP" altLang="en-US" smtClean="0"/>
+              <a:rPr lang="ja-JP" altLang="en-US"/>
               <a:t>第 </a:t>
             </a:r>
             <a:r>
-              <a:rPr lang="en-US" altLang="ja-JP" smtClean="0"/>
+              <a:rPr lang="en-US" altLang="ja-JP"/>
               <a:t>5 </a:t>
             </a:r>
             <a:r>
-              <a:rPr lang="ja-JP" altLang="en-US" smtClean="0"/>
+              <a:rPr lang="ja-JP" altLang="en-US"/>
               <a:t>レベル</a:t>
             </a:r>
             <a:endParaRPr lang="en-US" dirty="0"/>
@@ -4022,7 +4496,7 @@
             <a:fld id="{B61BEF0D-F0BB-DE4B-95CE-6DB70DBA9567}" type="datetimeFigureOut">
               <a:rPr lang="en-US" dirty="0"/>
               <a:pPr/>
-              <a:t>5/4/2016</a:t>
+              <a:t>5/16/2016</a:t>
             </a:fld>
             <a:endParaRPr lang="en-US" dirty="0"/>
           </a:p>
@@ -4117,7 +4591,7 @@
           <a:lstStyle/>
           <a:p>
             <a:r>
-              <a:rPr lang="ja-JP" altLang="en-US" smtClean="0"/>
+              <a:rPr lang="ja-JP" altLang="en-US"/>
               <a:t>マスター タイトルの書式設定</a:t>
             </a:r>
             <a:endParaRPr lang="en-US" dirty="0"/>
@@ -4142,7 +4616,7 @@
             <a:fld id="{B61BEF0D-F0BB-DE4B-95CE-6DB70DBA9567}" type="datetimeFigureOut">
               <a:rPr lang="en-US" dirty="0"/>
               <a:pPr/>
-              <a:t>5/4/2016</a:t>
+              <a:t>5/16/2016</a:t>
             </a:fld>
             <a:endParaRPr lang="en-US" dirty="0"/>
           </a:p>
@@ -4234,7 +4708,7 @@
             <a:fld id="{B61BEF0D-F0BB-DE4B-95CE-6DB70DBA9567}" type="datetimeFigureOut">
               <a:rPr lang="en-US" dirty="0"/>
               <a:pPr/>
-              <a:t>5/4/2016</a:t>
+              <a:t>5/16/2016</a:t>
             </a:fld>
             <a:endParaRPr lang="en-US" dirty="0"/>
           </a:p>
@@ -4335,7 +4809,7 @@
           </a:lstStyle>
           <a:p>
             <a:r>
-              <a:rPr lang="ja-JP" altLang="en-US" smtClean="0"/>
+              <a:rPr lang="ja-JP" altLang="en-US"/>
               <a:t>マスター タイトルの書式設定</a:t>
             </a:r>
             <a:endParaRPr lang="en-US" dirty="0"/>
@@ -4366,67 +4840,67 @@
           <a:p>
             <a:pPr lvl="0"/>
             <a:r>
-              <a:rPr lang="ja-JP" altLang="en-US" smtClean="0"/>
+              <a:rPr lang="ja-JP" altLang="en-US"/>
               <a:t>マスター テキストの書式設定</a:t>
             </a:r>
           </a:p>
           <a:p>
             <a:pPr lvl="1"/>
             <a:r>
-              <a:rPr lang="ja-JP" altLang="en-US" smtClean="0"/>
+              <a:rPr lang="ja-JP" altLang="en-US"/>
               <a:t>第 </a:t>
             </a:r>
             <a:r>
-              <a:rPr lang="en-US" altLang="ja-JP" smtClean="0"/>
+              <a:rPr lang="en-US" altLang="ja-JP"/>
               <a:t>2 </a:t>
             </a:r>
             <a:r>
-              <a:rPr lang="ja-JP" altLang="en-US" smtClean="0"/>
+              <a:rPr lang="ja-JP" altLang="en-US"/>
               <a:t>レベル</a:t>
             </a:r>
           </a:p>
           <a:p>
             <a:pPr lvl="2"/>
             <a:r>
-              <a:rPr lang="ja-JP" altLang="en-US" smtClean="0"/>
+              <a:rPr lang="ja-JP" altLang="en-US"/>
               <a:t>第 </a:t>
             </a:r>
             <a:r>
-              <a:rPr lang="en-US" altLang="ja-JP" smtClean="0"/>
+              <a:rPr lang="en-US" altLang="ja-JP"/>
               <a:t>3 </a:t>
             </a:r>
             <a:r>
-              <a:rPr lang="ja-JP" altLang="en-US" smtClean="0"/>
+              <a:rPr lang="ja-JP" altLang="en-US"/>
               <a:t>レベル</a:t>
             </a:r>
           </a:p>
           <a:p>
             <a:pPr lvl="3"/>
             <a:r>
-              <a:rPr lang="ja-JP" altLang="en-US" smtClean="0"/>
+              <a:rPr lang="ja-JP" altLang="en-US"/>
               <a:t>第 </a:t>
             </a:r>
             <a:r>
-              <a:rPr lang="en-US" altLang="ja-JP" smtClean="0"/>
+              <a:rPr lang="en-US" altLang="ja-JP"/>
               <a:t>4 </a:t>
             </a:r>
             <a:r>
-              <a:rPr lang="ja-JP" altLang="en-US" smtClean="0"/>
+              <a:rPr lang="ja-JP" altLang="en-US"/>
               <a:t>レベル</a:t>
             </a:r>
           </a:p>
           <a:p>
             <a:pPr lvl="4"/>
             <a:r>
-              <a:rPr lang="ja-JP" altLang="en-US" smtClean="0"/>
+              <a:rPr lang="ja-JP" altLang="en-US"/>
               <a:t>第 </a:t>
             </a:r>
             <a:r>
-              <a:rPr lang="en-US" altLang="ja-JP" smtClean="0"/>
+              <a:rPr lang="en-US" altLang="ja-JP"/>
               <a:t>5 </a:t>
             </a:r>
             <a:r>
-              <a:rPr lang="ja-JP" altLang="en-US" smtClean="0"/>
+              <a:rPr lang="ja-JP" altLang="en-US"/>
               <a:t>レベル</a:t>
             </a:r>
             <a:endParaRPr lang="en-US" dirty="0"/>
@@ -4494,7 +4968,7 @@
           <a:p>
             <a:pPr lvl="0"/>
             <a:r>
-              <a:rPr lang="ja-JP" altLang="en-US" smtClean="0"/>
+              <a:rPr lang="ja-JP" altLang="en-US"/>
               <a:t>マスター テキストの書式設定</a:t>
             </a:r>
           </a:p>
@@ -4517,7 +4991,7 @@
           <a:p>
             <a:fld id="{42A54C80-263E-416B-A8E0-580EDEADCBDC}" type="datetimeFigureOut">
               <a:rPr lang="en-US" dirty="0"/>
-              <a:t>5/4/2016</a:t>
+              <a:t>5/16/2016</a:t>
             </a:fld>
             <a:endParaRPr lang="en-US" dirty="0"/>
           </a:p>
@@ -4617,7 +5091,7 @@
           </a:lstStyle>
           <a:p>
             <a:r>
-              <a:rPr lang="ja-JP" altLang="en-US" smtClean="0"/>
+              <a:rPr lang="ja-JP" altLang="en-US"/>
               <a:t>マスター タイトルの書式設定</a:t>
             </a:r>
             <a:endParaRPr lang="en-US" dirty="0"/>
@@ -4684,7 +5158,7 @@
           </a:lstStyle>
           <a:p>
             <a:r>
-              <a:rPr lang="ja-JP" altLang="en-US" smtClean="0"/>
+              <a:rPr lang="ja-JP" altLang="en-US"/>
               <a:t>図を追加</a:t>
             </a:r>
             <a:endParaRPr lang="en-US" dirty="0"/>
@@ -4752,7 +5226,7 @@
           <a:p>
             <a:pPr lvl="0"/>
             <a:r>
-              <a:rPr lang="ja-JP" altLang="en-US" smtClean="0"/>
+              <a:rPr lang="ja-JP" altLang="en-US"/>
               <a:t>マスター テキストの書式設定</a:t>
             </a:r>
           </a:p>
@@ -4819,7 +5293,7 @@
             <a:fld id="{B61BEF0D-F0BB-DE4B-95CE-6DB70DBA9567}" type="datetimeFigureOut">
               <a:rPr lang="en-US" dirty="0"/>
               <a:pPr/>
-              <a:t>5/4/2016</a:t>
+              <a:t>5/16/2016</a:t>
             </a:fld>
             <a:endParaRPr lang="en-US" dirty="0"/>
           </a:p>
@@ -5412,7 +5886,7 @@
           <a:lstStyle/>
           <a:p>
             <a:r>
-              <a:rPr lang="ja-JP" altLang="en-US" smtClean="0"/>
+              <a:rPr lang="ja-JP" altLang="en-US"/>
               <a:t>マスター タイトルの書式設定</a:t>
             </a:r>
             <a:endParaRPr lang="en-US" dirty="0"/>
@@ -5446,67 +5920,67 @@
           <a:p>
             <a:pPr lvl="0"/>
             <a:r>
-              <a:rPr lang="ja-JP" altLang="en-US" smtClean="0"/>
+              <a:rPr lang="ja-JP" altLang="en-US"/>
               <a:t>マスター テキストの書式設定</a:t>
             </a:r>
           </a:p>
           <a:p>
             <a:pPr lvl="1"/>
             <a:r>
-              <a:rPr lang="ja-JP" altLang="en-US" smtClean="0"/>
+              <a:rPr lang="ja-JP" altLang="en-US"/>
               <a:t>第 </a:t>
             </a:r>
             <a:r>
-              <a:rPr lang="en-US" altLang="ja-JP" smtClean="0"/>
+              <a:rPr lang="en-US" altLang="ja-JP"/>
               <a:t>2 </a:t>
             </a:r>
             <a:r>
-              <a:rPr lang="ja-JP" altLang="en-US" smtClean="0"/>
+              <a:rPr lang="ja-JP" altLang="en-US"/>
               <a:t>レベル</a:t>
             </a:r>
           </a:p>
           <a:p>
             <a:pPr lvl="2"/>
             <a:r>
-              <a:rPr lang="ja-JP" altLang="en-US" smtClean="0"/>
+              <a:rPr lang="ja-JP" altLang="en-US"/>
               <a:t>第 </a:t>
             </a:r>
             <a:r>
-              <a:rPr lang="en-US" altLang="ja-JP" smtClean="0"/>
+              <a:rPr lang="en-US" altLang="ja-JP"/>
               <a:t>3 </a:t>
             </a:r>
             <a:r>
-              <a:rPr lang="ja-JP" altLang="en-US" smtClean="0"/>
+              <a:rPr lang="ja-JP" altLang="en-US"/>
               <a:t>レベル</a:t>
             </a:r>
           </a:p>
           <a:p>
             <a:pPr lvl="3"/>
             <a:r>
-              <a:rPr lang="ja-JP" altLang="en-US" smtClean="0"/>
+              <a:rPr lang="ja-JP" altLang="en-US"/>
               <a:t>第 </a:t>
             </a:r>
             <a:r>
-              <a:rPr lang="en-US" altLang="ja-JP" smtClean="0"/>
+              <a:rPr lang="en-US" altLang="ja-JP"/>
               <a:t>4 </a:t>
             </a:r>
             <a:r>
-              <a:rPr lang="ja-JP" altLang="en-US" smtClean="0"/>
+              <a:rPr lang="ja-JP" altLang="en-US"/>
               <a:t>レベル</a:t>
             </a:r>
           </a:p>
           <a:p>
             <a:pPr lvl="4"/>
             <a:r>
-              <a:rPr lang="ja-JP" altLang="en-US" smtClean="0"/>
+              <a:rPr lang="ja-JP" altLang="en-US"/>
               <a:t>第 </a:t>
             </a:r>
             <a:r>
-              <a:rPr lang="en-US" altLang="ja-JP" smtClean="0"/>
+              <a:rPr lang="en-US" altLang="ja-JP"/>
               <a:t>5 </a:t>
             </a:r>
             <a:r>
-              <a:rPr lang="ja-JP" altLang="en-US" smtClean="0"/>
+              <a:rPr lang="ja-JP" altLang="en-US"/>
               <a:t>レベル</a:t>
             </a:r>
             <a:endParaRPr lang="en-US" dirty="0"/>
@@ -5549,7 +6023,7 @@
             <a:fld id="{B61BEF0D-F0BB-DE4B-95CE-6DB70DBA9567}" type="datetimeFigureOut">
               <a:rPr lang="en-US" dirty="0"/>
               <a:pPr/>
-              <a:t>5/4/2016</a:t>
+              <a:t>5/16/2016</a:t>
             </a:fld>
             <a:endParaRPr lang="en-US" dirty="0"/>
           </a:p>
@@ -6090,30 +6564,26 @@
           <a:lstStyle/>
           <a:p>
             <a:r>
-              <a:rPr kumimoji="1" lang="ja-JP" altLang="en-US" dirty="0" smtClean="0"/>
+              <a:rPr kumimoji="1" lang="ja-JP" altLang="en-US" dirty="0"/>
               <a:t>システム工学基礎　</a:t>
             </a:r>
-            <a:r>
-              <a:rPr kumimoji="1" lang="en-US" altLang="ja-JP" dirty="0" smtClean="0"/>
-              <a:t/>
-            </a:r>
             <a:br>
-              <a:rPr kumimoji="1" lang="en-US" altLang="ja-JP" dirty="0" smtClean="0"/>
+              <a:rPr kumimoji="1" lang="en-US" altLang="ja-JP" dirty="0"/>
             </a:br>
             <a:r>
-              <a:rPr kumimoji="1" lang="ja-JP" altLang="en-US" dirty="0" smtClean="0"/>
+              <a:rPr kumimoji="1" lang="ja-JP" altLang="en-US" dirty="0"/>
               <a:t>レポート課題</a:t>
             </a:r>
             <a:r>
-              <a:rPr lang="en-US" altLang="ja-JP" dirty="0" smtClean="0"/>
+              <a:rPr lang="en-US" altLang="ja-JP" dirty="0"/>
               <a:t>(</a:t>
             </a:r>
             <a:r>
-              <a:rPr lang="ja-JP" altLang="en-US" dirty="0" smtClean="0"/>
+              <a:rPr lang="ja-JP" altLang="en-US" dirty="0"/>
               <a:t>その</a:t>
             </a:r>
             <a:r>
-              <a:rPr lang="en-US" altLang="ja-JP" dirty="0" smtClean="0"/>
+              <a:rPr lang="en-US" altLang="ja-JP" dirty="0"/>
               <a:t>1)</a:t>
             </a:r>
             <a:endParaRPr kumimoji="1" lang="ja-JP" altLang="en-US" dirty="0"/>
@@ -6138,55 +6608,55 @@
           <a:lstStyle/>
           <a:p>
             <a:r>
-              <a:rPr kumimoji="1" lang="ja-JP" altLang="en-US" dirty="0" smtClean="0"/>
+              <a:rPr kumimoji="1" lang="ja-JP" altLang="en-US" dirty="0"/>
               <a:t>システム</a:t>
             </a:r>
             <a:r>
-              <a:rPr lang="ja-JP" altLang="en-US" dirty="0" smtClean="0"/>
+              <a:rPr lang="ja-JP" altLang="en-US" dirty="0"/>
               <a:t>創成学科</a:t>
             </a:r>
             <a:r>
-              <a:rPr lang="en-US" altLang="ja-JP" dirty="0" smtClean="0"/>
+              <a:rPr lang="en-US" altLang="ja-JP" dirty="0"/>
               <a:t>SDM</a:t>
             </a:r>
             <a:r>
-              <a:rPr lang="ja-JP" altLang="en-US" dirty="0" smtClean="0"/>
+              <a:rPr lang="ja-JP" altLang="en-US" dirty="0"/>
               <a:t>コース</a:t>
             </a:r>
-            <a:endParaRPr lang="en-US" altLang="ja-JP" dirty="0" smtClean="0"/>
+            <a:endParaRPr lang="en-US" altLang="ja-JP" dirty="0"/>
           </a:p>
           <a:p>
             <a:r>
-              <a:rPr lang="ja-JP" altLang="en-US" dirty="0" smtClean="0"/>
+              <a:rPr lang="ja-JP" altLang="en-US" dirty="0"/>
               <a:t>担当教員</a:t>
             </a:r>
             <a:r>
-              <a:rPr lang="en-US" altLang="ja-JP" dirty="0" smtClean="0"/>
+              <a:rPr lang="en-US" altLang="ja-JP" dirty="0"/>
               <a:t>:</a:t>
             </a:r>
             <a:r>
-              <a:rPr lang="ja-JP" altLang="en-US" dirty="0" smtClean="0"/>
+              <a:rPr lang="ja-JP" altLang="en-US" dirty="0"/>
               <a:t>青山和浩</a:t>
             </a:r>
-            <a:endParaRPr lang="en-US" altLang="ja-JP" dirty="0" smtClean="0"/>
+            <a:endParaRPr lang="en-US" altLang="ja-JP" dirty="0"/>
           </a:p>
           <a:p>
             <a:r>
-              <a:rPr lang="ja-JP" altLang="en-US" dirty="0" smtClean="0"/>
+              <a:rPr lang="ja-JP" altLang="en-US" dirty="0"/>
               <a:t>氏名</a:t>
             </a:r>
             <a:r>
-              <a:rPr lang="en-US" altLang="ja-JP" dirty="0" smtClean="0"/>
+              <a:rPr lang="en-US" altLang="ja-JP" dirty="0"/>
               <a:t>:</a:t>
             </a:r>
             <a:r>
-              <a:rPr lang="ja-JP" altLang="en-US" dirty="0" smtClean="0"/>
+              <a:rPr lang="ja-JP" altLang="en-US" dirty="0"/>
               <a:t>西村弘平</a:t>
             </a:r>
-            <a:endParaRPr lang="en-US" altLang="ja-JP" dirty="0" smtClean="0"/>
+            <a:endParaRPr lang="en-US" altLang="ja-JP" dirty="0"/>
           </a:p>
           <a:p>
-            <a:endParaRPr lang="en-US" altLang="ja-JP" dirty="0" smtClean="0"/>
+            <a:endParaRPr lang="en-US" altLang="ja-JP" dirty="0"/>
           </a:p>
           <a:p>
             <a:endParaRPr kumimoji="1" lang="ja-JP" altLang="en-US" dirty="0"/>
@@ -6239,11 +6709,11 @@
           <a:lstStyle/>
           <a:p>
             <a:r>
-              <a:rPr lang="ja-JP" altLang="en-US" dirty="0" smtClean="0"/>
+              <a:rPr lang="ja-JP" altLang="en-US" dirty="0"/>
               <a:t>・問題</a:t>
             </a:r>
             <a:r>
-              <a:rPr lang="en-US" altLang="ja-JP" dirty="0" smtClean="0"/>
+              <a:rPr lang="en-US" altLang="ja-JP" dirty="0"/>
               <a:t>	</a:t>
             </a:r>
             <a:endParaRPr kumimoji="1" lang="ja-JP" altLang="en-US" dirty="0"/>
@@ -6276,65 +6746,65 @@
               <a:buNone/>
             </a:pPr>
             <a:r>
-              <a:rPr kumimoji="1" lang="ja-JP" altLang="en-US" dirty="0" smtClean="0"/>
+              <a:rPr kumimoji="1" lang="ja-JP" altLang="en-US" dirty="0"/>
               <a:t>大学生が一人暮らしの家を選ぶ際にすみよい家を選ぶ判断基準の関係性を示す。</a:t>
             </a:r>
-            <a:endParaRPr kumimoji="1" lang="en-US" altLang="ja-JP" dirty="0" smtClean="0"/>
+            <a:endParaRPr kumimoji="1" lang="en-US" altLang="ja-JP" dirty="0"/>
           </a:p>
           <a:p>
             <a:pPr marL="0" indent="0">
               <a:buNone/>
             </a:pPr>
             <a:r>
-              <a:rPr lang="ja-JP" altLang="en-US" dirty="0" smtClean="0"/>
+              <a:rPr lang="ja-JP" altLang="en-US" dirty="0"/>
               <a:t>選んだ要素は</a:t>
             </a:r>
-            <a:endParaRPr lang="en-US" altLang="ja-JP" dirty="0" smtClean="0"/>
+            <a:endParaRPr lang="en-US" altLang="ja-JP" dirty="0"/>
           </a:p>
           <a:p>
             <a:pPr marL="0" indent="0">
               <a:buNone/>
             </a:pPr>
             <a:r>
-              <a:rPr kumimoji="1" lang="ja-JP" altLang="en-US" dirty="0" smtClean="0"/>
+              <a:rPr kumimoji="1" lang="ja-JP" altLang="en-US" dirty="0"/>
               <a:t>・築年数                               </a:t>
             </a:r>
             <a:r>
-              <a:rPr lang="ja-JP" altLang="en-US" dirty="0" smtClean="0"/>
+              <a:rPr lang="ja-JP" altLang="en-US" dirty="0"/>
               <a:t>・安全性</a:t>
             </a:r>
             <a:r>
-              <a:rPr lang="en-US" altLang="ja-JP" dirty="0" smtClean="0"/>
+              <a:rPr lang="en-US" altLang="ja-JP" dirty="0"/>
               <a:t>(</a:t>
             </a:r>
             <a:r>
-              <a:rPr lang="ja-JP" altLang="en-US" dirty="0" smtClean="0"/>
+              <a:rPr lang="ja-JP" altLang="en-US" dirty="0"/>
               <a:t>対災害含</a:t>
             </a:r>
             <a:r>
-              <a:rPr lang="en-US" altLang="ja-JP" dirty="0" smtClean="0"/>
+              <a:rPr lang="en-US" altLang="ja-JP" dirty="0"/>
               <a:t>)</a:t>
             </a:r>
-            <a:endParaRPr kumimoji="1" lang="en-US" altLang="ja-JP" dirty="0" smtClean="0"/>
+            <a:endParaRPr kumimoji="1" lang="en-US" altLang="ja-JP" dirty="0"/>
           </a:p>
           <a:p>
             <a:pPr marL="0" indent="0">
               <a:buNone/>
             </a:pPr>
             <a:r>
-              <a:rPr lang="ja-JP" altLang="en-US" dirty="0" smtClean="0"/>
+              <a:rPr lang="ja-JP" altLang="en-US" dirty="0"/>
               <a:t>・家の材質                            ・利便性</a:t>
             </a:r>
             <a:r>
-              <a:rPr lang="en-US" altLang="ja-JP" dirty="0" smtClean="0"/>
+              <a:rPr lang="en-US" altLang="ja-JP" dirty="0"/>
               <a:t>(</a:t>
             </a:r>
             <a:r>
-              <a:rPr lang="ja-JP" altLang="en-US" dirty="0" smtClean="0"/>
+              <a:rPr lang="ja-JP" altLang="en-US" dirty="0"/>
               <a:t>交通面</a:t>
             </a:r>
             <a:r>
-              <a:rPr lang="en-US" altLang="ja-JP" dirty="0" smtClean="0"/>
+              <a:rPr lang="en-US" altLang="ja-JP" dirty="0"/>
               <a:t>)</a:t>
             </a:r>
           </a:p>
@@ -6343,104 +6813,103 @@
               <a:buNone/>
             </a:pPr>
             <a:r>
-              <a:rPr kumimoji="1" lang="ja-JP" altLang="en-US" dirty="0" smtClean="0"/>
+              <a:rPr kumimoji="1" lang="ja-JP" altLang="en-US" dirty="0"/>
               <a:t>・ユニットバス                     </a:t>
             </a:r>
             <a:r>
-              <a:rPr lang="ja-JP" altLang="en-US" dirty="0" smtClean="0"/>
+              <a:rPr lang="ja-JP" altLang="en-US" dirty="0"/>
               <a:t>・利便性</a:t>
             </a:r>
             <a:r>
-              <a:rPr lang="en-US" altLang="ja-JP" dirty="0" smtClean="0"/>
+              <a:rPr lang="en-US" altLang="ja-JP" dirty="0"/>
               <a:t>(</a:t>
             </a:r>
             <a:r>
-              <a:rPr lang="ja-JP" altLang="en-US" dirty="0" smtClean="0"/>
+              <a:rPr lang="ja-JP" altLang="en-US" dirty="0"/>
               <a:t>飲食面</a:t>
             </a:r>
             <a:r>
-              <a:rPr lang="en-US" altLang="ja-JP" dirty="0" smtClean="0"/>
+              <a:rPr lang="en-US" altLang="ja-JP" dirty="0"/>
               <a:t>)</a:t>
             </a:r>
-            <a:endParaRPr kumimoji="1" lang="en-US" altLang="ja-JP" dirty="0" smtClean="0"/>
+            <a:endParaRPr kumimoji="1" lang="en-US" altLang="ja-JP" dirty="0"/>
           </a:p>
           <a:p>
             <a:pPr marL="0" indent="0">
               <a:buNone/>
             </a:pPr>
             <a:r>
-              <a:rPr lang="ja-JP" altLang="en-US" dirty="0" smtClean="0"/>
+              <a:rPr lang="ja-JP" altLang="en-US" dirty="0"/>
               <a:t>・独立洗面台                        ・窓の向き</a:t>
             </a:r>
-            <a:endParaRPr lang="en-US" altLang="ja-JP" dirty="0" smtClean="0"/>
+            <a:endParaRPr lang="en-US" altLang="ja-JP" dirty="0"/>
           </a:p>
           <a:p>
             <a:pPr marL="0" indent="0">
               <a:buNone/>
             </a:pPr>
             <a:r>
-              <a:rPr kumimoji="1" lang="ja-JP" altLang="en-US" dirty="0" smtClean="0"/>
+              <a:rPr kumimoji="1" lang="ja-JP" altLang="en-US" dirty="0"/>
               <a:t>・家具付き                           ・地域の騒音</a:t>
             </a:r>
-            <a:endParaRPr kumimoji="1" lang="en-US" altLang="ja-JP" dirty="0" smtClean="0"/>
+            <a:endParaRPr kumimoji="1" lang="en-US" altLang="ja-JP" dirty="0"/>
           </a:p>
           <a:p>
             <a:pPr marL="0" indent="0">
               <a:buNone/>
             </a:pPr>
             <a:r>
-              <a:rPr lang="ja-JP" altLang="en-US" dirty="0" smtClean="0"/>
+              <a:rPr lang="ja-JP" altLang="en-US" dirty="0"/>
               <a:t>・部屋の広さ</a:t>
             </a:r>
             <a:r>
-              <a:rPr lang="en-US" altLang="ja-JP" dirty="0" smtClean="0"/>
+              <a:rPr lang="en-US" altLang="ja-JP" dirty="0"/>
               <a:t>			    </a:t>
             </a:r>
             <a:r>
-              <a:rPr lang="ja-JP" altLang="en-US" dirty="0" smtClean="0"/>
+              <a:rPr lang="ja-JP" altLang="en-US" dirty="0"/>
               <a:t>・管理会社</a:t>
             </a:r>
-            <a:endParaRPr lang="en-US" altLang="ja-JP" dirty="0" smtClean="0"/>
+            <a:endParaRPr lang="en-US" altLang="ja-JP" dirty="0"/>
           </a:p>
           <a:p>
             <a:pPr marL="0" indent="0">
               <a:buNone/>
             </a:pPr>
             <a:r>
-              <a:rPr kumimoji="1" lang="ja-JP" altLang="en-US" dirty="0" smtClean="0"/>
+              <a:rPr kumimoji="1" lang="ja-JP" altLang="en-US" dirty="0"/>
               <a:t>・収納スペースの広さ           ・暮らしやすさ</a:t>
             </a:r>
-            <a:endParaRPr kumimoji="1" lang="en-US" altLang="ja-JP" dirty="0" smtClean="0"/>
+            <a:endParaRPr kumimoji="1" lang="en-US" altLang="ja-JP" dirty="0"/>
           </a:p>
           <a:p>
             <a:pPr marL="0" indent="0">
               <a:buNone/>
             </a:pPr>
             <a:r>
-              <a:rPr lang="ja-JP" altLang="en-US" dirty="0" smtClean="0"/>
+              <a:rPr lang="ja-JP" altLang="en-US" dirty="0"/>
               <a:t>・部屋の階                            ・人の呼びやすさ</a:t>
             </a:r>
-            <a:endParaRPr lang="en-US" altLang="ja-JP" dirty="0" smtClean="0"/>
+            <a:endParaRPr lang="en-US" altLang="ja-JP" dirty="0"/>
           </a:p>
           <a:p>
             <a:pPr marL="0" indent="0">
               <a:buNone/>
             </a:pPr>
             <a:r>
-              <a:rPr lang="ja-JP" altLang="en-US" dirty="0" smtClean="0"/>
+              <a:rPr lang="ja-JP" altLang="en-US" dirty="0"/>
               <a:t>・オートロック</a:t>
             </a:r>
-            <a:endParaRPr lang="en-US" altLang="ja-JP" dirty="0" smtClean="0"/>
+            <a:endParaRPr lang="en-US" altLang="ja-JP" dirty="0"/>
           </a:p>
           <a:p>
             <a:pPr marL="0" indent="0">
               <a:buNone/>
             </a:pPr>
             <a:r>
-              <a:rPr kumimoji="1" lang="ja-JP" altLang="en-US" dirty="0" smtClean="0"/>
+              <a:rPr kumimoji="1" lang="ja-JP" altLang="en-US" dirty="0"/>
               <a:t>・家賃</a:t>
             </a:r>
-            <a:endParaRPr kumimoji="1" lang="ja-JP" altLang="en-US" dirty="0"/>
           </a:p>
         </p:txBody>
       </p:sp>
@@ -6490,10 +6959,9 @@
           <a:lstStyle/>
           <a:p>
             <a:r>
-              <a:rPr kumimoji="1" lang="ja-JP" altLang="en-US" dirty="0" smtClean="0"/>
+              <a:rPr kumimoji="1" lang="ja-JP" altLang="en-US" dirty="0"/>
               <a:t>各要素の関係</a:t>
             </a:r>
-            <a:endParaRPr kumimoji="1" lang="ja-JP" altLang="en-US" dirty="0"/>
           </a:p>
         </p:txBody>
       </p:sp>
@@ -6518,7 +6986,7 @@
           <a:lstStyle/>
           <a:p>
             <a:r>
-              <a:rPr kumimoji="1" lang="ja-JP" altLang="en-US" dirty="0" smtClean="0"/>
+              <a:rPr kumimoji="1" lang="ja-JP" altLang="en-US" dirty="0"/>
               <a:t>家内</a:t>
             </a:r>
             <a:r>
@@ -6526,23 +6994,23 @@
               <a:t>の</a:t>
             </a:r>
             <a:r>
-              <a:rPr kumimoji="1" lang="ja-JP" altLang="en-US" dirty="0" smtClean="0"/>
+              <a:rPr kumimoji="1" lang="ja-JP" altLang="en-US" dirty="0"/>
               <a:t>物理的要素</a:t>
             </a:r>
             <a:r>
-              <a:rPr kumimoji="1" lang="en-US" altLang="ja-JP" dirty="0" smtClean="0"/>
+              <a:rPr kumimoji="1" lang="en-US" altLang="ja-JP" dirty="0"/>
               <a:t>(</a:t>
             </a:r>
             <a:r>
-              <a:rPr kumimoji="1" lang="ja-JP" altLang="en-US" dirty="0" smtClean="0"/>
+              <a:rPr kumimoji="1" lang="ja-JP" altLang="en-US" dirty="0"/>
               <a:t>家賃</a:t>
             </a:r>
             <a:r>
-              <a:rPr lang="ja-JP" altLang="en-US" dirty="0" smtClean="0"/>
+              <a:rPr lang="ja-JP" altLang="en-US" dirty="0"/>
               <a:t>に影響</a:t>
             </a:r>
             <a:r>
-              <a:rPr lang="en-US" altLang="ja-JP" dirty="0" smtClean="0"/>
+              <a:rPr lang="en-US" altLang="ja-JP" dirty="0"/>
               <a:t>)</a:t>
             </a:r>
           </a:p>
@@ -6634,7 +7102,6 @@
               <a:rPr lang="en-US" altLang="ja-JP" dirty="0"/>
               <a:t>	</a:t>
             </a:r>
-            <a:endParaRPr lang="en-US" altLang="ja-JP" dirty="0" smtClean="0"/>
           </a:p>
           <a:p>
             <a:pPr marL="0" indent="0">
@@ -6644,19 +7111,19 @@
           </a:p>
           <a:p>
             <a:r>
-              <a:rPr lang="ja-JP" altLang="en-US" dirty="0" smtClean="0"/>
+              <a:rPr lang="ja-JP" altLang="en-US" dirty="0"/>
               <a:t>生活上の要素</a:t>
             </a:r>
             <a:r>
-              <a:rPr lang="en-US" altLang="ja-JP" dirty="0" smtClean="0"/>
+              <a:rPr lang="en-US" altLang="ja-JP" dirty="0"/>
               <a:t>(</a:t>
             </a:r>
             <a:r>
-              <a:rPr lang="ja-JP" altLang="en-US" dirty="0" smtClean="0"/>
+              <a:rPr lang="ja-JP" altLang="en-US" dirty="0"/>
               <a:t>暮らしやすさに影響</a:t>
             </a:r>
             <a:r>
-              <a:rPr lang="en-US" altLang="ja-JP" dirty="0" smtClean="0"/>
+              <a:rPr lang="en-US" altLang="ja-JP" dirty="0"/>
               <a:t>)</a:t>
             </a:r>
           </a:p>
@@ -6665,55 +7132,51 @@
               <a:buNone/>
             </a:pPr>
             <a:r>
-              <a:rPr lang="ja-JP" altLang="en-US" dirty="0" smtClean="0"/>
+              <a:rPr lang="ja-JP" altLang="en-US" dirty="0"/>
               <a:t>・安全性</a:t>
             </a:r>
             <a:r>
-              <a:rPr lang="en-US" altLang="ja-JP" dirty="0" smtClean="0"/>
+              <a:rPr lang="en-US" altLang="ja-JP" dirty="0"/>
               <a:t>(</a:t>
             </a:r>
             <a:r>
-              <a:rPr lang="ja-JP" altLang="en-US" dirty="0" smtClean="0"/>
+              <a:rPr lang="ja-JP" altLang="en-US" dirty="0"/>
               <a:t>対災害含</a:t>
             </a:r>
             <a:r>
-              <a:rPr lang="en-US" altLang="ja-JP" dirty="0" smtClean="0"/>
-              <a:t>)</a:t>
-            </a:r>
-            <a:r>
               <a:rPr lang="en-US" altLang="ja-JP" dirty="0"/>
-              <a:t>	</a:t>
-            </a:r>
-            <a:r>
-              <a:rPr lang="ja-JP" altLang="en-US" dirty="0" smtClean="0"/>
+              <a:t>)	</a:t>
+            </a:r>
+            <a:r>
+              <a:rPr lang="ja-JP" altLang="en-US" dirty="0"/>
               <a:t>・利便性</a:t>
             </a:r>
             <a:r>
-              <a:rPr lang="en-US" altLang="ja-JP" dirty="0" smtClean="0"/>
+              <a:rPr lang="en-US" altLang="ja-JP" dirty="0"/>
               <a:t>(</a:t>
             </a:r>
             <a:r>
-              <a:rPr lang="ja-JP" altLang="en-US" dirty="0" smtClean="0"/>
+              <a:rPr lang="ja-JP" altLang="en-US" dirty="0"/>
               <a:t>交通面</a:t>
             </a:r>
             <a:r>
-              <a:rPr lang="en-US" altLang="ja-JP" dirty="0" smtClean="0"/>
+              <a:rPr lang="en-US" altLang="ja-JP" dirty="0"/>
               <a:t>)		</a:t>
             </a:r>
             <a:r>
-              <a:rPr lang="ja-JP" altLang="en-US" dirty="0" smtClean="0"/>
+              <a:rPr lang="ja-JP" altLang="en-US" dirty="0"/>
               <a:t>・利便性</a:t>
             </a:r>
             <a:r>
-              <a:rPr lang="en-US" altLang="ja-JP" dirty="0" smtClean="0"/>
+              <a:rPr lang="en-US" altLang="ja-JP" dirty="0"/>
               <a:t>(</a:t>
             </a:r>
             <a:r>
-              <a:rPr lang="ja-JP" altLang="en-US" dirty="0" smtClean="0"/>
+              <a:rPr lang="ja-JP" altLang="en-US" dirty="0"/>
               <a:t>飲食面</a:t>
             </a:r>
             <a:r>
-              <a:rPr lang="en-US" altLang="ja-JP" dirty="0" smtClean="0"/>
+              <a:rPr lang="en-US" altLang="ja-JP" dirty="0"/>
               <a:t>)		</a:t>
             </a:r>
             <a:r>
@@ -6727,26 +7190,26 @@
               <a:buNone/>
             </a:pPr>
             <a:r>
-              <a:rPr lang="ja-JP" altLang="en-US" dirty="0" smtClean="0"/>
+              <a:rPr lang="ja-JP" altLang="en-US" dirty="0"/>
               <a:t>・管理会社</a:t>
             </a:r>
             <a:r>
-              <a:rPr lang="en-US" altLang="ja-JP" dirty="0" smtClean="0"/>
+              <a:rPr lang="en-US" altLang="ja-JP" dirty="0"/>
               <a:t>	</a:t>
             </a:r>
             <a:r>
-              <a:rPr lang="ja-JP" altLang="en-US" dirty="0" smtClean="0"/>
+              <a:rPr lang="ja-JP" altLang="en-US" dirty="0"/>
               <a:t>・暮らしやすさ</a:t>
             </a:r>
             <a:r>
-              <a:rPr lang="en-US" altLang="ja-JP" dirty="0" smtClean="0"/>
+              <a:rPr lang="en-US" altLang="ja-JP" dirty="0"/>
               <a:t>	</a:t>
             </a:r>
             <a:r>
-              <a:rPr lang="ja-JP" altLang="en-US" dirty="0" smtClean="0"/>
+              <a:rPr lang="ja-JP" altLang="en-US" dirty="0"/>
               <a:t>・人の呼びやすさ</a:t>
             </a:r>
-            <a:endParaRPr lang="en-US" altLang="ja-JP" dirty="0" smtClean="0"/>
+            <a:endParaRPr lang="en-US" altLang="ja-JP" dirty="0"/>
           </a:p>
         </p:txBody>
       </p:sp>
@@ -6796,15 +7259,15 @@
           <a:lstStyle/>
           <a:p>
             <a:r>
-              <a:rPr kumimoji="1" lang="ja-JP" altLang="en-US" dirty="0" smtClean="0"/>
+              <a:rPr kumimoji="1" lang="ja-JP" altLang="en-US" dirty="0"/>
               <a:t>各要素の関係</a:t>
             </a:r>
             <a:r>
-              <a:rPr kumimoji="1" lang="en-US" altLang="ja-JP" dirty="0" smtClean="0"/>
+              <a:rPr kumimoji="1" lang="en-US" altLang="ja-JP" dirty="0"/>
               <a:t>(</a:t>
             </a:r>
             <a:r>
-              <a:rPr lang="ja-JP" altLang="en-US" dirty="0" smtClean="0"/>
+              <a:rPr lang="ja-JP" altLang="en-US" dirty="0"/>
               <a:t>行列表示</a:t>
             </a:r>
             <a:r>
@@ -14324,7 +14787,7 @@
           <a:lstStyle/>
           <a:p>
             <a:r>
-              <a:rPr lang="ja-JP" altLang="en-US" dirty="0" smtClean="0"/>
+              <a:rPr lang="ja-JP" altLang="en-US" dirty="0"/>
               <a:t>要因の構造化</a:t>
             </a:r>
             <a:endParaRPr kumimoji="1" lang="ja-JP" altLang="en-US" dirty="0"/>
@@ -14352,14 +14815,14 @@
           <a:lstStyle/>
           <a:p>
             <a:r>
-              <a:rPr kumimoji="1" lang="en-US" altLang="ja-JP" dirty="0" smtClean="0"/>
+              <a:rPr kumimoji="1" lang="en-US" altLang="ja-JP" dirty="0"/>
               <a:t>ISM</a:t>
             </a:r>
             <a:r>
-              <a:rPr kumimoji="1" lang="ja-JP" altLang="en-US" dirty="0" smtClean="0"/>
+              <a:rPr kumimoji="1" lang="ja-JP" altLang="en-US" dirty="0"/>
               <a:t>法を用いて構造化すると以下の可到達行列が得られる。</a:t>
             </a:r>
-            <a:endParaRPr kumimoji="1" lang="en-US" altLang="ja-JP" dirty="0" smtClean="0"/>
+            <a:endParaRPr kumimoji="1" lang="en-US" altLang="ja-JP" dirty="0"/>
           </a:p>
           <a:p>
             <a:pPr marL="0" indent="0">
@@ -22587,15 +23050,11 @@
           <a:lstStyle/>
           <a:p>
             <a:r>
-              <a:rPr lang="ja-JP" altLang="en-US" dirty="0" smtClean="0"/>
+              <a:rPr lang="ja-JP" altLang="en-US" dirty="0"/>
               <a:t>項目間の関係図示</a:t>
             </a:r>
-            <a:r>
-              <a:rPr lang="en-US" altLang="ja-JP" dirty="0" smtClean="0"/>
-              <a:t/>
-            </a:r>
             <a:br>
-              <a:rPr lang="en-US" altLang="ja-JP" dirty="0" smtClean="0"/>
+              <a:rPr lang="en-US" altLang="ja-JP" dirty="0"/>
             </a:br>
             <a:endParaRPr kumimoji="1" lang="ja-JP" altLang="en-US" dirty="0"/>
           </a:p>
@@ -22666,10 +23125,9 @@
           <a:lstStyle/>
           <a:p>
             <a:r>
-              <a:rPr kumimoji="1" lang="ja-JP" altLang="en-US" dirty="0" smtClean="0"/>
+              <a:rPr kumimoji="1" lang="ja-JP" altLang="en-US" dirty="0"/>
               <a:t>まとめ</a:t>
             </a:r>
-            <a:endParaRPr kumimoji="1" lang="ja-JP" altLang="en-US" dirty="0"/>
           </a:p>
         </p:txBody>
       </p:sp>
@@ -22696,6 +23154,131 @@
     <p:extLst>
       <p:ext uri="{BB962C8B-B14F-4D97-AF65-F5344CB8AC3E}">
         <p14:creationId xmlns:p14="http://schemas.microsoft.com/office/powerpoint/2010/main" val="1530579651"/>
+      </p:ext>
+    </p:extLst>
+  </p:cSld>
+  <p:clrMapOvr>
+    <a:masterClrMapping/>
+  </p:clrMapOvr>
+</p:sld>
+</file>
+
+<file path=ppt/slides/slide8.xml><?xml version="1.0" encoding="utf-8"?>
+<p:sld xmlns:a="http://schemas.openxmlformats.org/drawingml/2006/main" xmlns:r="http://schemas.openxmlformats.org/officeDocument/2006/relationships" xmlns:p="http://schemas.openxmlformats.org/presentationml/2006/main">
+  <p:cSld>
+    <p:spTree>
+      <p:nvGrpSpPr>
+        <p:cNvPr id="1" name=""/>
+        <p:cNvGrpSpPr/>
+        <p:nvPr/>
+      </p:nvGrpSpPr>
+      <p:grpSpPr>
+        <a:xfrm>
+          <a:off x="0" y="0"/>
+          <a:ext cx="0" cy="0"/>
+          <a:chOff x="0" y="0"/>
+          <a:chExt cx="0" cy="0"/>
+        </a:xfrm>
+      </p:grpSpPr>
+      <p:sp>
+        <p:nvSpPr>
+          <p:cNvPr id="2" name="タイトル 1"/>
+          <p:cNvSpPr>
+            <a:spLocks noGrp="1"/>
+          </p:cNvSpPr>
+          <p:nvPr>
+            <p:ph type="title"/>
+          </p:nvPr>
+        </p:nvSpPr>
+        <p:spPr/>
+        <p:txBody>
+          <a:bodyPr/>
+          <a:lstStyle/>
+          <a:p>
+            <a:endParaRPr lang="ja-JP" altLang="en-US"/>
+          </a:p>
+        </p:txBody>
+      </p:sp>
+      <p:sp>
+        <p:nvSpPr>
+          <p:cNvPr id="3" name="テキスト プレースホルダー 2"/>
+          <p:cNvSpPr>
+            <a:spLocks noGrp="1"/>
+          </p:cNvSpPr>
+          <p:nvPr>
+            <p:ph type="body" idx="1"/>
+          </p:nvPr>
+        </p:nvSpPr>
+        <p:spPr/>
+        <p:txBody>
+          <a:bodyPr/>
+          <a:lstStyle/>
+          <a:p>
+            <a:endParaRPr lang="ja-JP" altLang="en-US"/>
+          </a:p>
+        </p:txBody>
+      </p:sp>
+      <p:sp>
+        <p:nvSpPr>
+          <p:cNvPr id="4" name="コンテンツ プレースホルダー 3"/>
+          <p:cNvSpPr>
+            <a:spLocks noGrp="1"/>
+          </p:cNvSpPr>
+          <p:nvPr>
+            <p:ph sz="half" idx="2"/>
+          </p:nvPr>
+        </p:nvSpPr>
+        <p:spPr/>
+        <p:txBody>
+          <a:bodyPr/>
+          <a:lstStyle/>
+          <a:p>
+            <a:endParaRPr lang="ja-JP" altLang="en-US"/>
+          </a:p>
+        </p:txBody>
+      </p:sp>
+      <p:sp>
+        <p:nvSpPr>
+          <p:cNvPr id="5" name="テキスト プレースホルダー 4"/>
+          <p:cNvSpPr>
+            <a:spLocks noGrp="1"/>
+          </p:cNvSpPr>
+          <p:nvPr>
+            <p:ph type="body" sz="quarter" idx="3"/>
+          </p:nvPr>
+        </p:nvSpPr>
+        <p:spPr/>
+        <p:txBody>
+          <a:bodyPr/>
+          <a:lstStyle/>
+          <a:p>
+            <a:endParaRPr lang="ja-JP" altLang="en-US"/>
+          </a:p>
+        </p:txBody>
+      </p:sp>
+      <p:sp>
+        <p:nvSpPr>
+          <p:cNvPr id="6" name="コンテンツ プレースホルダー 5"/>
+          <p:cNvSpPr>
+            <a:spLocks noGrp="1"/>
+          </p:cNvSpPr>
+          <p:nvPr>
+            <p:ph sz="quarter" idx="4"/>
+          </p:nvPr>
+        </p:nvSpPr>
+        <p:spPr/>
+        <p:txBody>
+          <a:bodyPr/>
+          <a:lstStyle/>
+          <a:p>
+            <a:endParaRPr lang="ja-JP" altLang="en-US"/>
+          </a:p>
+        </p:txBody>
+      </p:sp>
+    </p:spTree>
+    <p:extLst>
+      <p:ext uri="{BB962C8B-B14F-4D97-AF65-F5344CB8AC3E}">
+        <p14:creationId xmlns:p14="http://schemas.microsoft.com/office/powerpoint/2010/main" val="4200341301"/>
       </p:ext>
     </p:extLst>
   </p:cSld>
@@ -22960,4 +23543,299 @@
     </a:ext>
   </a:extLst>
 </a:theme>
+</file>
+
+<file path=ppt/theme/theme2.xml><?xml version="1.0" encoding="utf-8"?>
+<a:theme xmlns:a="http://schemas.openxmlformats.org/drawingml/2006/main" name="Office テーマ">
+  <a:themeElements>
+    <a:clrScheme name="Office">
+      <a:dk1>
+        <a:sysClr val="windowText" lastClr="000000"/>
+      </a:dk1>
+      <a:lt1>
+        <a:sysClr val="window" lastClr="FFFFFF"/>
+      </a:lt1>
+      <a:dk2>
+        <a:srgbClr val="44546A"/>
+      </a:dk2>
+      <a:lt2>
+        <a:srgbClr val="E7E6E6"/>
+      </a:lt2>
+      <a:accent1>
+        <a:srgbClr val="5B9BD5"/>
+      </a:accent1>
+      <a:accent2>
+        <a:srgbClr val="ED7D31"/>
+      </a:accent2>
+      <a:accent3>
+        <a:srgbClr val="A5A5A5"/>
+      </a:accent3>
+      <a:accent4>
+        <a:srgbClr val="FFC000"/>
+      </a:accent4>
+      <a:accent5>
+        <a:srgbClr val="4472C4"/>
+      </a:accent5>
+      <a:accent6>
+        <a:srgbClr val="70AD47"/>
+      </a:accent6>
+      <a:hlink>
+        <a:srgbClr val="0563C1"/>
+      </a:hlink>
+      <a:folHlink>
+        <a:srgbClr val="954F72"/>
+      </a:folHlink>
+    </a:clrScheme>
+    <a:fontScheme name="Office">
+      <a:majorFont>
+        <a:latin typeface="游ゴシック Light" panose="020F0302020204030204"/>
+        <a:ea typeface=""/>
+        <a:cs typeface=""/>
+        <a:font script="Jpan" typeface="游ゴシック Light"/>
+        <a:font script="Hang" typeface="맑은 고딕"/>
+        <a:font script="Hans" typeface="等线 Light"/>
+        <a:font script="Hant" typeface="新細明體"/>
+        <a:font script="Arab" typeface="Times New Roman"/>
+        <a:font script="Hebr" typeface="Times New Roman"/>
+        <a:font script="Thai" typeface="Angsana New"/>
+        <a:font script="Ethi" typeface="Nyala"/>
+        <a:font script="Beng" typeface="Vrinda"/>
+        <a:font script="Gujr" typeface="Shruti"/>
+        <a:font script="Khmr" typeface="MoolBoran"/>
+        <a:font script="Knda" typeface="Tunga"/>
+        <a:font script="Guru" typeface="Raavi"/>
+        <a:font script="Cans" typeface="Euphemia"/>
+        <a:font script="Cher" typeface="Plantagenet Cherokee"/>
+        <a:font script="Yiii" typeface="Microsoft Yi Baiti"/>
+        <a:font script="Tibt" typeface="Microsoft Himalaya"/>
+        <a:font script="Thaa" typeface="MV Boli"/>
+        <a:font script="Deva" typeface="Mangal"/>
+        <a:font script="Telu" typeface="Gautami"/>
+        <a:font script="Taml" typeface="Latha"/>
+        <a:font script="Syrc" typeface="Estrangelo Edessa"/>
+        <a:font script="Orya" typeface="Kalinga"/>
+        <a:font script="Mlym" typeface="Kartika"/>
+        <a:font script="Laoo" typeface="DokChampa"/>
+        <a:font script="Sinh" typeface="Iskoola Pota"/>
+        <a:font script="Mong" typeface="Mongolian Baiti"/>
+        <a:font script="Viet" typeface="Times New Roman"/>
+        <a:font script="Uigh" typeface="Microsoft Uighur"/>
+        <a:font script="Geor" typeface="Sylfaen"/>
+        <a:font script="Armn" typeface="Arial"/>
+        <a:font script="Bugi" typeface="Leelawadee UI"/>
+        <a:font script="Bopo" typeface="Microsoft JhengHei"/>
+        <a:font script="Java" typeface="Javanese Text"/>
+        <a:font script="Lisu" typeface="Segoe UI"/>
+        <a:font script="Mymr" typeface="Myanmar Text"/>
+        <a:font script="Nkoo" typeface="Ebrima"/>
+        <a:font script="Olck" typeface="Nirmala UI"/>
+        <a:font script="Osma" typeface="Ebrima"/>
+        <a:font script="Phag" typeface="Phagspa"/>
+        <a:font script="Syrn" typeface="Estrangelo Edessa"/>
+        <a:font script="Syrj" typeface="Estrangelo Edessa"/>
+        <a:font script="Syre" typeface="Estrangelo Edessa"/>
+        <a:font script="Sora" typeface="Nirmala UI"/>
+        <a:font script="Tale" typeface="Microsoft Tai Le"/>
+        <a:font script="Talu" typeface="Microsoft New Tai Lue"/>
+        <a:font script="Tfng" typeface="Ebrima"/>
+      </a:majorFont>
+      <a:minorFont>
+        <a:latin typeface="游ゴシック" panose="020F0502020204030204"/>
+        <a:ea typeface=""/>
+        <a:cs typeface=""/>
+        <a:font script="Jpan" typeface="游ゴシック"/>
+        <a:font script="Hang" typeface="맑은 고딕"/>
+        <a:font script="Hans" typeface="等线"/>
+        <a:font script="Hant" typeface="新細明體"/>
+        <a:font script="Arab" typeface="Arial"/>
+        <a:font script="Hebr" typeface="Arial"/>
+        <a:font script="Thai" typeface="Cordia New"/>
+        <a:font script="Ethi" typeface="Nyala"/>
+        <a:font script="Beng" typeface="Vrinda"/>
+        <a:font script="Gujr" typeface="Shruti"/>
+        <a:font script="Khmr" typeface="DaunPenh"/>
+        <a:font script="Knda" typeface="Tunga"/>
+        <a:font script="Guru" typeface="Raavi"/>
+        <a:font script="Cans" typeface="Euphemia"/>
+        <a:font script="Cher" typeface="Plantagenet Cherokee"/>
+        <a:font script="Yiii" typeface="Microsoft Yi Baiti"/>
+        <a:font script="Tibt" typeface="Microsoft Himalaya"/>
+        <a:font script="Thaa" typeface="MV Boli"/>
+        <a:font script="Deva" typeface="Mangal"/>
+        <a:font script="Telu" typeface="Gautami"/>
+        <a:font script="Taml" typeface="Latha"/>
+        <a:font script="Syrc" typeface="Estrangelo Edessa"/>
+        <a:font script="Orya" typeface="Kalinga"/>
+        <a:font script="Mlym" typeface="Kartika"/>
+        <a:font script="Laoo" typeface="DokChampa"/>
+        <a:font script="Sinh" typeface="Iskoola Pota"/>
+        <a:font script="Mong" typeface="Mongolian Baiti"/>
+        <a:font script="Viet" typeface="Arial"/>
+        <a:font script="Uigh" typeface="Microsoft Uighur"/>
+        <a:font script="Geor" typeface="Sylfaen"/>
+        <a:font script="Armn" typeface="Arial"/>
+        <a:font script="Bugi" typeface="Leelawadee UI"/>
+        <a:font script="Bopo" typeface="Microsoft JhengHei"/>
+        <a:font script="Java" typeface="Javanese Text"/>
+        <a:font script="Lisu" typeface="Segoe UI"/>
+        <a:font script="Mymr" typeface="Myanmar Text"/>
+        <a:font script="Nkoo" typeface="Ebrima"/>
+        <a:font script="Olck" typeface="Nirmala UI"/>
+        <a:font script="Osma" typeface="Ebrima"/>
+        <a:font script="Phag" typeface="Phagspa"/>
+        <a:font script="Syrn" typeface="Estrangelo Edessa"/>
+        <a:font script="Syrj" typeface="Estrangelo Edessa"/>
+        <a:font script="Syre" typeface="Estrangelo Edessa"/>
+        <a:font script="Sora" typeface="Nirmala UI"/>
+        <a:font script="Tale" typeface="Microsoft Tai Le"/>
+        <a:font script="Talu" typeface="Microsoft New Tai Lue"/>
+        <a:font script="Tfng" typeface="Ebrima"/>
+      </a:minorFont>
+    </a:fontScheme>
+    <a:fmtScheme name="Office">
+      <a:fillStyleLst>
+        <a:solidFill>
+          <a:schemeClr val="phClr"/>
+        </a:solidFill>
+        <a:gradFill rotWithShape="1">
+          <a:gsLst>
+            <a:gs pos="0">
+              <a:schemeClr val="phClr">
+                <a:lumMod val="110000"/>
+                <a:satMod val="105000"/>
+                <a:tint val="67000"/>
+              </a:schemeClr>
+            </a:gs>
+            <a:gs pos="50000">
+              <a:schemeClr val="phClr">
+                <a:lumMod val="105000"/>
+                <a:satMod val="103000"/>
+                <a:tint val="73000"/>
+              </a:schemeClr>
+            </a:gs>
+            <a:gs pos="100000">
+              <a:schemeClr val="phClr">
+                <a:lumMod val="105000"/>
+                <a:satMod val="109000"/>
+                <a:tint val="81000"/>
+              </a:schemeClr>
+            </a:gs>
+          </a:gsLst>
+          <a:lin ang="5400000" scaled="0"/>
+        </a:gradFill>
+        <a:gradFill rotWithShape="1">
+          <a:gsLst>
+            <a:gs pos="0">
+              <a:schemeClr val="phClr">
+                <a:satMod val="103000"/>
+                <a:lumMod val="102000"/>
+                <a:tint val="94000"/>
+              </a:schemeClr>
+            </a:gs>
+            <a:gs pos="50000">
+              <a:schemeClr val="phClr">
+                <a:satMod val="110000"/>
+                <a:lumMod val="100000"/>
+                <a:shade val="100000"/>
+              </a:schemeClr>
+            </a:gs>
+            <a:gs pos="100000">
+              <a:schemeClr val="phClr">
+                <a:lumMod val="99000"/>
+                <a:satMod val="120000"/>
+                <a:shade val="78000"/>
+              </a:schemeClr>
+            </a:gs>
+          </a:gsLst>
+          <a:lin ang="5400000" scaled="0"/>
+        </a:gradFill>
+      </a:fillStyleLst>
+      <a:lnStyleLst>
+        <a:ln w="6350" cap="flat" cmpd="sng" algn="ctr">
+          <a:solidFill>
+            <a:schemeClr val="phClr"/>
+          </a:solidFill>
+          <a:prstDash val="solid"/>
+          <a:miter lim="800000"/>
+        </a:ln>
+        <a:ln w="12700" cap="flat" cmpd="sng" algn="ctr">
+          <a:solidFill>
+            <a:schemeClr val="phClr"/>
+          </a:solidFill>
+          <a:prstDash val="solid"/>
+          <a:miter lim="800000"/>
+        </a:ln>
+        <a:ln w="19050" cap="flat" cmpd="sng" algn="ctr">
+          <a:solidFill>
+            <a:schemeClr val="phClr"/>
+          </a:solidFill>
+          <a:prstDash val="solid"/>
+          <a:miter lim="800000"/>
+        </a:ln>
+      </a:lnStyleLst>
+      <a:effectStyleLst>
+        <a:effectStyle>
+          <a:effectLst/>
+        </a:effectStyle>
+        <a:effectStyle>
+          <a:effectLst/>
+        </a:effectStyle>
+        <a:effectStyle>
+          <a:effectLst>
+            <a:outerShdw blurRad="57150" dist="19050" dir="5400000" algn="ctr" rotWithShape="0">
+              <a:srgbClr val="000000">
+                <a:alpha val="63000"/>
+              </a:srgbClr>
+            </a:outerShdw>
+          </a:effectLst>
+        </a:effectStyle>
+      </a:effectStyleLst>
+      <a:bgFillStyleLst>
+        <a:solidFill>
+          <a:schemeClr val="phClr"/>
+        </a:solidFill>
+        <a:solidFill>
+          <a:schemeClr val="phClr">
+            <a:tint val="95000"/>
+            <a:satMod val="170000"/>
+          </a:schemeClr>
+        </a:solidFill>
+        <a:gradFill rotWithShape="1">
+          <a:gsLst>
+            <a:gs pos="0">
+              <a:schemeClr val="phClr">
+                <a:tint val="93000"/>
+                <a:satMod val="150000"/>
+                <a:shade val="98000"/>
+                <a:lumMod val="102000"/>
+              </a:schemeClr>
+            </a:gs>
+            <a:gs pos="50000">
+              <a:schemeClr val="phClr">
+                <a:tint val="98000"/>
+                <a:satMod val="130000"/>
+                <a:shade val="90000"/>
+                <a:lumMod val="103000"/>
+              </a:schemeClr>
+            </a:gs>
+            <a:gs pos="100000">
+              <a:schemeClr val="phClr">
+                <a:shade val="63000"/>
+                <a:satMod val="120000"/>
+              </a:schemeClr>
+            </a:gs>
+          </a:gsLst>
+          <a:lin ang="5400000" scaled="0"/>
+        </a:gradFill>
+      </a:bgFillStyleLst>
+    </a:fmtScheme>
+  </a:themeElements>
+  <a:objectDefaults/>
+  <a:extraClrSchemeLst/>
+  <a:extLst>
+    <a:ext uri="{05A4C25C-085E-4340-85A3-A5531E510DB2}">
+      <thm15:themeFamily xmlns:thm15="http://schemas.microsoft.com/office/thememl/2012/main" name="Office Theme" id="{62F939B6-93AF-4DB8-9C6B-D6C7DFDC589F}" vid="{4A3C46E8-61CC-4603-A589-7422A47A8E4A}"/>
+    </a:ext>
+  </a:extLst>
+</a:theme>
 </file>
</xml_diff>